<commit_message>
Update to send to github
</commit_message>
<xml_diff>
--- a/Building an Information Management Code Library.pptx
+++ b/Building an Information Management Code Library.pptx
@@ -6,10 +6,14 @@
   </p:sldMasterIdLst>
   <p:sldIdLst>
     <p:sldId id="256" r:id="rId2"/>
-    <p:sldId id="258" r:id="rId3"/>
-    <p:sldId id="259" r:id="rId4"/>
-    <p:sldId id="260" r:id="rId5"/>
-    <p:sldId id="261" r:id="rId6"/>
+    <p:sldId id="262" r:id="rId3"/>
+    <p:sldId id="258" r:id="rId4"/>
+    <p:sldId id="265" r:id="rId5"/>
+    <p:sldId id="259" r:id="rId6"/>
+    <p:sldId id="261" r:id="rId7"/>
+    <p:sldId id="260" r:id="rId8"/>
+    <p:sldId id="264" r:id="rId9"/>
+    <p:sldId id="263" r:id="rId10"/>
   </p:sldIdLst>
   <p:sldSz cx="12192000" cy="6858000"/>
   <p:notesSz cx="6858000" cy="9144000"/>
@@ -108,6 +112,11 @@
       </a:defRPr>
     </a:lvl9pPr>
   </p:defaultTextStyle>
+  <p:extLst>
+    <p:ext uri="{EFAFB233-063F-42B5-8137-9DF3F51BA10A}">
+      <p15:sldGuideLst xmlns:p15="http://schemas.microsoft.com/office/powerpoint/2012/main"/>
+    </p:ext>
+  </p:extLst>
 </p:presentation>
 </file>
 
@@ -337,7 +346,7 @@
           <a:p>
             <a:fld id="{CA364462-489C-44DB-9AFB-A6D942F03258}" type="datetimeFigureOut">
               <a:rPr lang="en-US" smtClean="0"/>
-              <a:t>7/12/2017</a:t>
+              <a:t>7/13/2017</a:t>
             </a:fld>
             <a:endParaRPr lang="en-US"/>
           </a:p>
@@ -358,7 +367,11 @@
           <a:bodyPr/>
           <a:lstStyle/>
           <a:p>
-            <a:endParaRPr lang="en-US"/>
+            <a:r>
+              <a:rPr lang="en-US" dirty="0" smtClean="0"/>
+              <a:t>ESIP Meeting July 24-28, 2017</a:t>
+            </a:r>
+            <a:endParaRPr lang="en-US" dirty="0"/>
           </a:p>
         </p:txBody>
       </p:sp>
@@ -423,6 +436,36 @@
           </a:fontRef>
         </p:style>
       </p:cxnSp>
+      <p:pic>
+        <p:nvPicPr>
+          <p:cNvPr id="10" name="Picture 9"/>
+          <p:cNvPicPr>
+            <a:picLocks noChangeAspect="1"/>
+          </p:cNvPicPr>
+          <p:nvPr userDrawn="1"/>
+        </p:nvPicPr>
+        <p:blipFill>
+          <a:blip r:embed="rId2" cstate="print">
+            <a:extLst>
+              <a:ext uri="{28A0092B-C50C-407E-A947-70E740481C1C}">
+                <a14:useLocalDpi xmlns:a14="http://schemas.microsoft.com/office/drawing/2010/main" val="0"/>
+              </a:ext>
+            </a:extLst>
+          </a:blip>
+          <a:stretch>
+            <a:fillRect/>
+          </a:stretch>
+        </p:blipFill>
+        <p:spPr>
+          <a:xfrm>
+            <a:off x="11319617" y="5311211"/>
+            <a:ext cx="764136" cy="764136"/>
+          </a:xfrm>
+          <a:prstGeom prst="rect">
+            <a:avLst/>
+          </a:prstGeom>
+        </p:spPr>
+      </p:pic>
     </p:spTree>
     <p:extLst>
       <p:ext uri="{BB962C8B-B14F-4D97-AF65-F5344CB8AC3E}">
@@ -545,7 +588,7 @@
           <a:p>
             <a:fld id="{CA364462-489C-44DB-9AFB-A6D942F03258}" type="datetimeFigureOut">
               <a:rPr lang="en-US" smtClean="0"/>
-              <a:t>7/12/2017</a:t>
+              <a:t>7/13/2017</a:t>
             </a:fld>
             <a:endParaRPr lang="en-US"/>
           </a:p>
@@ -801,7 +844,7 @@
           <a:p>
             <a:fld id="{CA364462-489C-44DB-9AFB-A6D942F03258}" type="datetimeFigureOut">
               <a:rPr lang="en-US" smtClean="0"/>
-              <a:t>7/12/2017</a:t>
+              <a:t>7/13/2017</a:t>
             </a:fld>
             <a:endParaRPr lang="en-US"/>
           </a:p>
@@ -975,7 +1018,7 @@
           <a:p>
             <a:fld id="{CA364462-489C-44DB-9AFB-A6D942F03258}" type="datetimeFigureOut">
               <a:rPr lang="en-US" smtClean="0"/>
-              <a:t>7/12/2017</a:t>
+              <a:t>7/13/2017</a:t>
             </a:fld>
             <a:endParaRPr lang="en-US"/>
           </a:p>
@@ -996,7 +1039,11 @@
           <a:bodyPr/>
           <a:lstStyle/>
           <a:p>
-            <a:endParaRPr lang="en-US"/>
+            <a:r>
+              <a:rPr lang="en-US" dirty="0" smtClean="0"/>
+              <a:t>ESIP Meeting, July 24-28, 2017</a:t>
+            </a:r>
+            <a:endParaRPr lang="en-US" dirty="0"/>
           </a:p>
         </p:txBody>
       </p:sp>
@@ -1023,6 +1070,36 @@
           </a:p>
         </p:txBody>
       </p:sp>
+      <p:pic>
+        <p:nvPicPr>
+          <p:cNvPr id="7" name="Picture 6"/>
+          <p:cNvPicPr>
+            <a:picLocks noChangeAspect="1"/>
+          </p:cNvPicPr>
+          <p:nvPr userDrawn="1"/>
+        </p:nvPicPr>
+        <p:blipFill>
+          <a:blip r:embed="rId2" cstate="print">
+            <a:extLst>
+              <a:ext uri="{28A0092B-C50C-407E-A947-70E740481C1C}">
+                <a14:useLocalDpi xmlns:a14="http://schemas.microsoft.com/office/drawing/2010/main" val="0"/>
+              </a:ext>
+            </a:extLst>
+          </a:blip>
+          <a:stretch>
+            <a:fillRect/>
+          </a:stretch>
+        </p:blipFill>
+        <p:spPr>
+          <a:xfrm>
+            <a:off x="11319617" y="5311211"/>
+            <a:ext cx="764136" cy="764136"/>
+          </a:xfrm>
+          <a:prstGeom prst="rect">
+            <a:avLst/>
+          </a:prstGeom>
+        </p:spPr>
+      </p:pic>
     </p:spTree>
     <p:extLst>
       <p:ext uri="{BB962C8B-B14F-4D97-AF65-F5344CB8AC3E}">
@@ -1318,7 +1395,7 @@
           <a:p>
             <a:fld id="{CA364462-489C-44DB-9AFB-A6D942F03258}" type="datetimeFigureOut">
               <a:rPr lang="en-US" smtClean="0"/>
-              <a:t>7/12/2017</a:t>
+              <a:t>7/13/2017</a:t>
             </a:fld>
             <a:endParaRPr lang="en-US"/>
           </a:p>
@@ -1593,7 +1670,7 @@
           <a:p>
             <a:fld id="{CA364462-489C-44DB-9AFB-A6D942F03258}" type="datetimeFigureOut">
               <a:rPr lang="en-US" smtClean="0"/>
-              <a:t>7/12/2017</a:t>
+              <a:t>7/13/2017</a:t>
             </a:fld>
             <a:endParaRPr lang="en-US"/>
           </a:p>
@@ -1972,7 +2049,7 @@
           <a:p>
             <a:fld id="{CA364462-489C-44DB-9AFB-A6D942F03258}" type="datetimeFigureOut">
               <a:rPr lang="en-US" smtClean="0"/>
-              <a:t>7/12/2017</a:t>
+              <a:t>7/13/2017</a:t>
             </a:fld>
             <a:endParaRPr lang="en-US"/>
           </a:p>
@@ -2090,7 +2167,7 @@
           <a:p>
             <a:fld id="{CA364462-489C-44DB-9AFB-A6D942F03258}" type="datetimeFigureOut">
               <a:rPr lang="en-US" smtClean="0"/>
-              <a:t>7/12/2017</a:t>
+              <a:t>7/13/2017</a:t>
             </a:fld>
             <a:endParaRPr lang="en-US"/>
           </a:p>
@@ -2261,7 +2338,7 @@
           <a:p>
             <a:fld id="{CA364462-489C-44DB-9AFB-A6D942F03258}" type="datetimeFigureOut">
               <a:rPr lang="en-US" smtClean="0"/>
-              <a:t>7/12/2017</a:t>
+              <a:t>7/13/2017</a:t>
             </a:fld>
             <a:endParaRPr lang="en-US"/>
           </a:p>
@@ -2615,7 +2692,7 @@
           <a:p>
             <a:fld id="{CA364462-489C-44DB-9AFB-A6D942F03258}" type="datetimeFigureOut">
               <a:rPr lang="en-US" smtClean="0"/>
-              <a:t>7/12/2017</a:t>
+              <a:t>7/13/2017</a:t>
             </a:fld>
             <a:endParaRPr lang="en-US"/>
           </a:p>
@@ -2997,7 +3074,7 @@
           <a:p>
             <a:fld id="{CA364462-489C-44DB-9AFB-A6D942F03258}" type="datetimeFigureOut">
               <a:rPr lang="en-US" smtClean="0"/>
-              <a:t>7/12/2017</a:t>
+              <a:t>7/13/2017</a:t>
             </a:fld>
             <a:endParaRPr lang="en-US"/>
           </a:p>
@@ -3284,7 +3361,7 @@
           <a:p>
             <a:fld id="{CA364462-489C-44DB-9AFB-A6D942F03258}" type="datetimeFigureOut">
               <a:rPr lang="en-US" smtClean="0"/>
-              <a:t>7/12/2017</a:t>
+              <a:t>7/13/2017</a:t>
             </a:fld>
             <a:endParaRPr lang="en-US"/>
           </a:p>
@@ -3922,7 +3999,7 @@
           <a:p>
             <a:r>
               <a:rPr lang="en-US" dirty="0" smtClean="0"/>
-              <a:t>What should an IM Code Repository Accomplish?</a:t>
+              <a:t>What is the IM code repository?</a:t>
             </a:r>
             <a:endParaRPr lang="en-US" dirty="0"/>
           </a:p>
@@ -3949,7 +4026,7 @@
             </a:pPr>
             <a:r>
               <a:rPr lang="en-US" dirty="0" smtClean="0"/>
-              <a:t>Who are the contributors/users of this repository?</a:t>
+              <a:t>A place to go for information management code solutions</a:t>
             </a:r>
           </a:p>
           <a:p>
@@ -3959,7 +4036,7 @@
             </a:pPr>
             <a:r>
               <a:rPr lang="en-US" dirty="0" smtClean="0"/>
-              <a:t>What is the range of tasks that code should apply to?</a:t>
+              <a:t>A community space, where IM community participants contribute code and discover code to re-use</a:t>
             </a:r>
           </a:p>
           <a:p>
@@ -3969,14 +4046,16 @@
             </a:pPr>
             <a:r>
               <a:rPr lang="en-US" dirty="0" smtClean="0"/>
-              <a:t>Are all programming languages acceptable?</a:t>
-            </a:r>
-          </a:p>
-          <a:p>
-            <a:pPr>
-              <a:buFont typeface="Wingdings" panose="05000000000000000000" pitchFamily="2" charset="2"/>
-              <a:buChar char="q"/>
-            </a:pPr>
+              <a:t>Our goal today is to create a </a:t>
+            </a:r>
+            <a:r>
+              <a:rPr lang="en-US" i="1" dirty="0" smtClean="0"/>
+              <a:t>blueprint</a:t>
+            </a:r>
+            <a:r>
+              <a:rPr lang="en-US" dirty="0" smtClean="0"/>
+              <a:t> for how the IM code repository will operate</a:t>
+            </a:r>
             <a:endParaRPr lang="en-US" dirty="0"/>
           </a:p>
         </p:txBody>
@@ -3984,7 +4063,7 @@
     </p:spTree>
     <p:extLst>
       <p:ext uri="{BB962C8B-B14F-4D97-AF65-F5344CB8AC3E}">
-        <p14:creationId xmlns:p14="http://schemas.microsoft.com/office/powerpoint/2010/main" val="3779115533"/>
+        <p14:creationId xmlns:p14="http://schemas.microsoft.com/office/powerpoint/2010/main" val="4277792442"/>
       </p:ext>
     </p:extLst>
   </p:cSld>
@@ -4028,7 +4107,7 @@
           <a:p>
             <a:r>
               <a:rPr lang="en-US" dirty="0" smtClean="0"/>
-              <a:t>How should we structure the IM Code Repository?</a:t>
+              <a:t>Our vision</a:t>
             </a:r>
             <a:endParaRPr lang="en-US" dirty="0"/>
           </a:p>
@@ -4055,8 +4134,17 @@
             </a:pPr>
             <a:r>
               <a:rPr lang="en-US" dirty="0" smtClean="0"/>
-              <a:t>Decentralized approach – the repository is essentially a catalog, pointing to whatever repository the code developer prefers</a:t>
-            </a:r>
+              <a:t>Contributors/users </a:t>
+            </a:r>
+            <a:r>
+              <a:rPr lang="en-US" dirty="0" smtClean="0"/>
+              <a:t>of this </a:t>
+            </a:r>
+            <a:r>
+              <a:rPr lang="en-US" dirty="0" smtClean="0"/>
+              <a:t>repository</a:t>
+            </a:r>
+            <a:endParaRPr lang="en-US" dirty="0" smtClean="0"/>
           </a:p>
           <a:p>
             <a:pPr>
@@ -4064,12 +4152,20 @@
               <a:buChar char="q"/>
             </a:pPr>
             <a:r>
+              <a:rPr lang="en-US" dirty="0"/>
+              <a:t>R</a:t>
+            </a:r>
+            <a:r>
               <a:rPr lang="en-US" dirty="0" smtClean="0"/>
-              <a:t>Centralized approach – all code in </a:t>
-            </a:r>
-            <a:r>
-              <a:rPr lang="en-US" dirty="0" err="1" smtClean="0"/>
-              <a:t>github</a:t>
+              <a:t>ange </a:t>
+            </a:r>
+            <a:r>
+              <a:rPr lang="en-US" dirty="0" smtClean="0"/>
+              <a:t>of tasks </a:t>
+            </a:r>
+            <a:r>
+              <a:rPr lang="en-US" dirty="0" smtClean="0"/>
+              <a:t>to which code should apply</a:t>
             </a:r>
             <a:endParaRPr lang="en-US" dirty="0" smtClean="0"/>
           </a:p>
@@ -4080,25 +4176,226 @@
             </a:pPr>
             <a:r>
               <a:rPr lang="en-US" dirty="0" smtClean="0"/>
-              <a:t>Hybrid approach -- </a:t>
-            </a:r>
-          </a:p>
-          <a:p>
-            <a:pPr marL="0" indent="0">
-              <a:buNone/>
-            </a:pPr>
-            <a:r>
-              <a:rPr lang="en-US" dirty="0" smtClean="0"/>
-              <a:t>Each on separate slide?</a:t>
+              <a:t>Acceptable programming languages</a:t>
             </a:r>
             <a:endParaRPr lang="en-US" dirty="0"/>
+          </a:p>
+        </p:txBody>
+      </p:sp>
+      <p:pic>
+        <p:nvPicPr>
+          <p:cNvPr id="4" name="Picture 3"/>
+          <p:cNvPicPr>
+            <a:picLocks noChangeAspect="1"/>
+          </p:cNvPicPr>
+          <p:nvPr/>
+        </p:nvPicPr>
+        <p:blipFill>
+          <a:blip r:embed="rId2" cstate="print">
+            <a:extLst>
+              <a:ext uri="{28A0092B-C50C-407E-A947-70E740481C1C}">
+                <a14:useLocalDpi xmlns:a14="http://schemas.microsoft.com/office/drawing/2010/main" val="0"/>
+              </a:ext>
+            </a:extLst>
+          </a:blip>
+          <a:stretch>
+            <a:fillRect/>
+          </a:stretch>
+        </p:blipFill>
+        <p:spPr>
+          <a:xfrm>
+            <a:off x="6225037" y="1737360"/>
+            <a:ext cx="1300480" cy="1300480"/>
+          </a:xfrm>
+          <a:prstGeom prst="rect">
+            <a:avLst/>
+          </a:prstGeom>
+        </p:spPr>
+      </p:pic>
+      <p:pic>
+        <p:nvPicPr>
+          <p:cNvPr id="7" name="Picture 6"/>
+          <p:cNvPicPr>
+            <a:picLocks noChangeAspect="1"/>
+          </p:cNvPicPr>
+          <p:nvPr/>
+        </p:nvPicPr>
+        <p:blipFill>
+          <a:blip r:embed="rId3" cstate="print">
+            <a:extLst>
+              <a:ext uri="{28A0092B-C50C-407E-A947-70E740481C1C}">
+                <a14:useLocalDpi xmlns:a14="http://schemas.microsoft.com/office/drawing/2010/main" val="0"/>
+              </a:ext>
+            </a:extLst>
+          </a:blip>
+          <a:stretch>
+            <a:fillRect/>
+          </a:stretch>
+        </p:blipFill>
+        <p:spPr>
+          <a:xfrm>
+            <a:off x="5508370" y="4368604"/>
+            <a:ext cx="1081537" cy="1068152"/>
+          </a:xfrm>
+          <a:prstGeom prst="rect">
+            <a:avLst/>
+          </a:prstGeom>
+        </p:spPr>
+      </p:pic>
+      <p:pic>
+        <p:nvPicPr>
+          <p:cNvPr id="9" name="Picture 8"/>
+          <p:cNvPicPr>
+            <a:picLocks noChangeAspect="1"/>
+          </p:cNvPicPr>
+          <p:nvPr/>
+        </p:nvPicPr>
+        <p:blipFill>
+          <a:blip r:embed="rId4">
+            <a:extLst>
+              <a:ext uri="{28A0092B-C50C-407E-A947-70E740481C1C}">
+                <a14:useLocalDpi xmlns:a14="http://schemas.microsoft.com/office/drawing/2010/main" val="0"/>
+              </a:ext>
+            </a:extLst>
+          </a:blip>
+          <a:stretch>
+            <a:fillRect/>
+          </a:stretch>
+        </p:blipFill>
+        <p:spPr>
+          <a:xfrm>
+            <a:off x="1202862" y="4868460"/>
+            <a:ext cx="1121341" cy="986948"/>
+          </a:xfrm>
+          <a:prstGeom prst="rect">
+            <a:avLst/>
+          </a:prstGeom>
+        </p:spPr>
+      </p:pic>
+      <p:pic>
+        <p:nvPicPr>
+          <p:cNvPr id="10" name="Picture 9"/>
+          <p:cNvPicPr>
+            <a:picLocks noChangeAspect="1"/>
+          </p:cNvPicPr>
+          <p:nvPr/>
+        </p:nvPicPr>
+        <p:blipFill>
+          <a:blip r:embed="rId5" cstate="print">
+            <a:extLst>
+              <a:ext uri="{28A0092B-C50C-407E-A947-70E740481C1C}">
+                <a14:useLocalDpi xmlns:a14="http://schemas.microsoft.com/office/drawing/2010/main" val="0"/>
+              </a:ext>
+            </a:extLst>
+          </a:blip>
+          <a:stretch>
+            <a:fillRect/>
+          </a:stretch>
+        </p:blipFill>
+        <p:spPr>
+          <a:xfrm>
+            <a:off x="1836485" y="4129506"/>
+            <a:ext cx="1445201" cy="1847962"/>
+          </a:xfrm>
+          <a:prstGeom prst="rect">
+            <a:avLst/>
+          </a:prstGeom>
+        </p:spPr>
+      </p:pic>
+      <p:pic>
+        <p:nvPicPr>
+          <p:cNvPr id="11" name="Picture 10"/>
+          <p:cNvPicPr>
+            <a:picLocks noChangeAspect="1"/>
+          </p:cNvPicPr>
+          <p:nvPr/>
+        </p:nvPicPr>
+        <p:blipFill>
+          <a:blip r:embed="rId6" cstate="print">
+            <a:extLst>
+              <a:ext uri="{28A0092B-C50C-407E-A947-70E740481C1C}">
+                <a14:useLocalDpi xmlns:a14="http://schemas.microsoft.com/office/drawing/2010/main" val="0"/>
+              </a:ext>
+            </a:extLst>
+          </a:blip>
+          <a:stretch>
+            <a:fillRect/>
+          </a:stretch>
+        </p:blipFill>
+        <p:spPr>
+          <a:xfrm>
+            <a:off x="2766214" y="4021132"/>
+            <a:ext cx="914402" cy="694945"/>
+          </a:xfrm>
+          <a:prstGeom prst="rect">
+            <a:avLst/>
+          </a:prstGeom>
+        </p:spPr>
+      </p:pic>
+      <p:pic>
+        <p:nvPicPr>
+          <p:cNvPr id="12" name="Picture 11"/>
+          <p:cNvPicPr>
+            <a:picLocks noChangeAspect="1"/>
+          </p:cNvPicPr>
+          <p:nvPr/>
+        </p:nvPicPr>
+        <p:blipFill>
+          <a:blip r:embed="rId7" cstate="print">
+            <a:extLst>
+              <a:ext uri="{28A0092B-C50C-407E-A947-70E740481C1C}">
+                <a14:useLocalDpi xmlns:a14="http://schemas.microsoft.com/office/drawing/2010/main" val="0"/>
+              </a:ext>
+            </a:extLst>
+          </a:blip>
+          <a:stretch>
+            <a:fillRect/>
+          </a:stretch>
+        </p:blipFill>
+        <p:spPr>
+          <a:xfrm>
+            <a:off x="6589907" y="3346902"/>
+            <a:ext cx="1871220" cy="1865462"/>
+          </a:xfrm>
+          <a:prstGeom prst="rect">
+            <a:avLst/>
+          </a:prstGeom>
+        </p:spPr>
+      </p:pic>
+      <p:sp>
+        <p:nvSpPr>
+          <p:cNvPr id="13" name="TextBox 12"/>
+          <p:cNvSpPr txBox="1"/>
+          <p:nvPr/>
+        </p:nvSpPr>
+        <p:spPr>
+          <a:xfrm>
+            <a:off x="7479271" y="5166524"/>
+            <a:ext cx="2329132" cy="200055"/>
+          </a:xfrm>
+          <a:prstGeom prst="rect">
+            <a:avLst/>
+          </a:prstGeom>
+          <a:noFill/>
+        </p:spPr>
+        <p:txBody>
+          <a:bodyPr wrap="square" rtlCol="0">
+            <a:spAutoFit/>
+          </a:bodyPr>
+          <a:lstStyle/>
+          <a:p>
+            <a:r>
+              <a:rPr lang="en-US" sz="700" dirty="0" smtClean="0"/>
+              <a:t>http://kepler-project.org</a:t>
+            </a:r>
+            <a:endParaRPr lang="en-US" sz="700" dirty="0"/>
           </a:p>
         </p:txBody>
       </p:sp>
     </p:spTree>
     <p:extLst>
       <p:ext uri="{BB962C8B-B14F-4D97-AF65-F5344CB8AC3E}">
-        <p14:creationId xmlns:p14="http://schemas.microsoft.com/office/powerpoint/2010/main" val="1122169451"/>
+        <p14:creationId xmlns:p14="http://schemas.microsoft.com/office/powerpoint/2010/main" val="3779115533"/>
       </p:ext>
     </p:extLst>
   </p:cSld>
@@ -4137,46 +4434,107 @@
         </p:nvSpPr>
         <p:spPr/>
         <p:txBody>
-          <a:bodyPr>
-            <a:normAutofit fontScale="90000"/>
-          </a:bodyPr>
-          <a:lstStyle/>
-          <a:p>
+          <a:bodyPr/>
+          <a:lstStyle/>
+          <a:p>
+            <a:r>
+              <a:rPr lang="en-US" dirty="0" smtClean="0"/>
+              <a:t>Considerations:</a:t>
+            </a:r>
+            <a:endParaRPr lang="en-US" dirty="0"/>
+          </a:p>
+        </p:txBody>
+      </p:sp>
+      <p:sp>
+        <p:nvSpPr>
+          <p:cNvPr id="3" name="Content Placeholder 2"/>
+          <p:cNvSpPr>
+            <a:spLocks noGrp="1"/>
+          </p:cNvSpPr>
+          <p:nvPr>
+            <p:ph idx="1"/>
+          </p:nvPr>
+        </p:nvSpPr>
+        <p:spPr/>
+        <p:txBody>
+          <a:bodyPr/>
+          <a:lstStyle/>
+          <a:p>
+            <a:pPr>
+              <a:buFont typeface="Wingdings" panose="05000000000000000000" pitchFamily="2" charset="2"/>
+              <a:buChar char="q"/>
+            </a:pPr>
+            <a:r>
+              <a:rPr lang="en-US" dirty="0" smtClean="0"/>
+              <a:t>Repository structure</a:t>
+            </a:r>
+          </a:p>
+          <a:p>
+            <a:pPr>
+              <a:buFont typeface="Wingdings" panose="05000000000000000000" pitchFamily="2" charset="2"/>
+              <a:buChar char="q"/>
+            </a:pPr>
             <a:r>
               <a:rPr lang="en-US" dirty="0"/>
-              <a:t>What are the minimum requirements for a script before the script is added to the code library?</a:t>
-            </a:r>
-            <a:endParaRPr lang="en-US" dirty="0"/>
-          </a:p>
-        </p:txBody>
-      </p:sp>
-      <p:sp>
-        <p:nvSpPr>
-          <p:cNvPr id="3" name="Content Placeholder 2"/>
-          <p:cNvSpPr>
-            <a:spLocks noGrp="1"/>
-          </p:cNvSpPr>
-          <p:nvPr>
-            <p:ph idx="1"/>
-          </p:nvPr>
-        </p:nvSpPr>
-        <p:spPr/>
-        <p:txBody>
-          <a:bodyPr/>
-          <a:lstStyle/>
-          <a:p>
+              <a:t>Governance</a:t>
+            </a:r>
+          </a:p>
+          <a:p>
+            <a:pPr>
+              <a:buFont typeface="Wingdings" panose="05000000000000000000" pitchFamily="2" charset="2"/>
+              <a:buChar char="q"/>
+            </a:pPr>
             <a:r>
               <a:rPr lang="en-US" dirty="0" smtClean="0"/>
-              <a:t>This seems to assume we choose the centralized approach</a:t>
-            </a:r>
-            <a:endParaRPr lang="en-US" dirty="0"/>
-          </a:p>
-        </p:txBody>
-      </p:sp>
+              <a:t>Discoverability</a:t>
+            </a:r>
+          </a:p>
+          <a:p>
+            <a:pPr>
+              <a:buFont typeface="Wingdings" panose="05000000000000000000" pitchFamily="2" charset="2"/>
+              <a:buChar char="q"/>
+            </a:pPr>
+            <a:r>
+              <a:rPr lang="en-US" dirty="0" smtClean="0"/>
+              <a:t>Re-use</a:t>
+            </a:r>
+          </a:p>
+        </p:txBody>
+      </p:sp>
+      <p:pic>
+        <p:nvPicPr>
+          <p:cNvPr id="4" name="Picture 3"/>
+          <p:cNvPicPr>
+            <a:picLocks noChangeAspect="1"/>
+          </p:cNvPicPr>
+          <p:nvPr/>
+        </p:nvPicPr>
+        <p:blipFill>
+          <a:blip r:embed="rId2" cstate="print">
+            <a:extLst>
+              <a:ext uri="{28A0092B-C50C-407E-A947-70E740481C1C}">
+                <a14:useLocalDpi xmlns:a14="http://schemas.microsoft.com/office/drawing/2010/main" val="0"/>
+              </a:ext>
+            </a:extLst>
+          </a:blip>
+          <a:stretch>
+            <a:fillRect/>
+          </a:stretch>
+        </p:blipFill>
+        <p:spPr>
+          <a:xfrm>
+            <a:off x="10427856" y="1975449"/>
+            <a:ext cx="1232092" cy="1621766"/>
+          </a:xfrm>
+          <a:prstGeom prst="rect">
+            <a:avLst/>
+          </a:prstGeom>
+        </p:spPr>
+      </p:pic>
     </p:spTree>
     <p:extLst>
       <p:ext uri="{BB962C8B-B14F-4D97-AF65-F5344CB8AC3E}">
-        <p14:creationId xmlns:p14="http://schemas.microsoft.com/office/powerpoint/2010/main" val="463228703"/>
+        <p14:creationId xmlns:p14="http://schemas.microsoft.com/office/powerpoint/2010/main" val="3847008629"/>
       </p:ext>
     </p:extLst>
   </p:cSld>
@@ -4220,7 +4578,7 @@
           <a:p>
             <a:r>
               <a:rPr lang="en-US" dirty="0" smtClean="0"/>
-              <a:t>How should the code library be governed?</a:t>
+              <a:t>How should we structure the IM Code Repository?</a:t>
             </a:r>
             <a:endParaRPr lang="en-US" dirty="0"/>
           </a:p>
@@ -4241,14 +4599,841 @@
           <a:bodyPr/>
           <a:lstStyle/>
           <a:p>
-            <a:endParaRPr lang="en-US"/>
-          </a:p>
-        </p:txBody>
-      </p:sp>
+            <a:pPr>
+              <a:buFont typeface="Wingdings" panose="05000000000000000000" pitchFamily="2" charset="2"/>
+              <a:buChar char="q"/>
+            </a:pPr>
+            <a:r>
+              <a:rPr lang="en-US" dirty="0" smtClean="0"/>
+              <a:t>Decentralized approach – the repository is essentially a catalog, pointing to whatever repository the code developer </a:t>
+            </a:r>
+            <a:r>
+              <a:rPr lang="en-US" dirty="0" smtClean="0"/>
+              <a:t>prefers</a:t>
+            </a:r>
+          </a:p>
+          <a:p>
+            <a:pPr>
+              <a:buFont typeface="Wingdings" panose="05000000000000000000" pitchFamily="2" charset="2"/>
+              <a:buChar char="q"/>
+            </a:pPr>
+            <a:r>
+              <a:rPr lang="en-US" dirty="0" smtClean="0"/>
+              <a:t>Centralized </a:t>
+            </a:r>
+            <a:r>
+              <a:rPr lang="en-US" dirty="0" smtClean="0"/>
+              <a:t>approach – all code </a:t>
+            </a:r>
+            <a:r>
+              <a:rPr lang="en-US" dirty="0" smtClean="0"/>
+              <a:t>is in </a:t>
+            </a:r>
+            <a:r>
+              <a:rPr lang="en-US" dirty="0" err="1" smtClean="0"/>
+              <a:t>github</a:t>
+            </a:r>
+            <a:endParaRPr lang="en-US" dirty="0" smtClean="0"/>
+          </a:p>
+          <a:p>
+            <a:pPr>
+              <a:buFont typeface="Wingdings" panose="05000000000000000000" pitchFamily="2" charset="2"/>
+              <a:buChar char="q"/>
+            </a:pPr>
+            <a:r>
+              <a:rPr lang="en-US" dirty="0" smtClean="0"/>
+              <a:t>Hybrid approach </a:t>
+            </a:r>
+            <a:r>
+              <a:rPr lang="en-US" dirty="0" smtClean="0"/>
+              <a:t>– a catalog plus the centralized repository</a:t>
+            </a:r>
+          </a:p>
+          <a:p>
+            <a:pPr>
+              <a:buFont typeface="Wingdings" panose="05000000000000000000" pitchFamily="2" charset="2"/>
+              <a:buChar char="q"/>
+            </a:pPr>
+            <a:r>
+              <a:rPr lang="en-US" dirty="0"/>
+              <a:t>Issues:  </a:t>
+            </a:r>
+            <a:endParaRPr lang="en-US" dirty="0" smtClean="0"/>
+          </a:p>
+          <a:p>
+            <a:pPr lvl="1">
+              <a:buFont typeface="Wingdings" panose="05000000000000000000" pitchFamily="2" charset="2"/>
+              <a:buChar char="q"/>
+            </a:pPr>
+            <a:r>
+              <a:rPr lang="en-US" dirty="0" smtClean="0"/>
+              <a:t>Searching within and across code repositories</a:t>
+            </a:r>
+          </a:p>
+          <a:p>
+            <a:pPr lvl="1">
+              <a:buFont typeface="Wingdings" panose="05000000000000000000" pitchFamily="2" charset="2"/>
+              <a:buChar char="q"/>
+            </a:pPr>
+            <a:r>
+              <a:rPr lang="en-US" dirty="0" smtClean="0"/>
+              <a:t>Repository persistence</a:t>
+            </a:r>
+          </a:p>
+          <a:p>
+            <a:pPr lvl="1">
+              <a:buFont typeface="Wingdings" panose="05000000000000000000" pitchFamily="2" charset="2"/>
+              <a:buChar char="q"/>
+            </a:pPr>
+            <a:r>
+              <a:rPr lang="en-US" dirty="0" smtClean="0"/>
+              <a:t>DOI assignment</a:t>
+            </a:r>
+          </a:p>
+          <a:p>
+            <a:pPr lvl="1">
+              <a:buFont typeface="Wingdings" panose="05000000000000000000" pitchFamily="2" charset="2"/>
+              <a:buChar char="q"/>
+            </a:pPr>
+            <a:r>
+              <a:rPr lang="en-US" dirty="0"/>
+              <a:t>G</a:t>
+            </a:r>
+            <a:r>
+              <a:rPr lang="en-US" dirty="0" smtClean="0"/>
+              <a:t>overnance</a:t>
+            </a:r>
+            <a:endParaRPr lang="en-US" dirty="0"/>
+          </a:p>
+          <a:p>
+            <a:pPr>
+              <a:buFont typeface="Wingdings" panose="05000000000000000000" pitchFamily="2" charset="2"/>
+              <a:buChar char="q"/>
+            </a:pPr>
+            <a:endParaRPr lang="en-US" dirty="0" smtClean="0"/>
+          </a:p>
+        </p:txBody>
+      </p:sp>
+    </p:spTree>
+    <p:extLst>
+      <p:ext uri="{BB962C8B-B14F-4D97-AF65-F5344CB8AC3E}">
+        <p14:creationId xmlns:p14="http://schemas.microsoft.com/office/powerpoint/2010/main" val="1122169451"/>
+      </p:ext>
+    </p:extLst>
+  </p:cSld>
+  <p:clrMapOvr>
+    <a:masterClrMapping/>
+  </p:clrMapOvr>
+</p:sld>
+</file>
+
+<file path=ppt/slides/slide6.xml><?xml version="1.0" encoding="utf-8"?>
+<p:sld xmlns:a="http://schemas.openxmlformats.org/drawingml/2006/main" xmlns:r="http://schemas.openxmlformats.org/officeDocument/2006/relationships" xmlns:p="http://schemas.openxmlformats.org/presentationml/2006/main">
+  <p:cSld>
+    <p:spTree>
+      <p:nvGrpSpPr>
+        <p:cNvPr id="1" name=""/>
+        <p:cNvGrpSpPr/>
+        <p:nvPr/>
+      </p:nvGrpSpPr>
+      <p:grpSpPr>
+        <a:xfrm>
+          <a:off x="0" y="0"/>
+          <a:ext cx="0" cy="0"/>
+          <a:chOff x="0" y="0"/>
+          <a:chExt cx="0" cy="0"/>
+        </a:xfrm>
+      </p:grpSpPr>
+      <p:sp>
+        <p:nvSpPr>
+          <p:cNvPr id="2" name="Title 1"/>
+          <p:cNvSpPr>
+            <a:spLocks noGrp="1"/>
+          </p:cNvSpPr>
+          <p:nvPr>
+            <p:ph type="title"/>
+          </p:nvPr>
+        </p:nvSpPr>
+        <p:spPr/>
+        <p:txBody>
+          <a:bodyPr/>
+          <a:lstStyle/>
+          <a:p>
+            <a:r>
+              <a:rPr lang="en-US" dirty="0" smtClean="0"/>
+              <a:t>How should the code </a:t>
+            </a:r>
+            <a:r>
+              <a:rPr lang="en-US" dirty="0" smtClean="0"/>
+              <a:t>repository</a:t>
+            </a:r>
+            <a:r>
+              <a:rPr lang="en-US" dirty="0" smtClean="0"/>
+              <a:t> </a:t>
+            </a:r>
+            <a:r>
+              <a:rPr lang="en-US" dirty="0" smtClean="0"/>
+              <a:t>be governed?</a:t>
+            </a:r>
+            <a:endParaRPr lang="en-US" dirty="0"/>
+          </a:p>
+        </p:txBody>
+      </p:sp>
+      <p:sp>
+        <p:nvSpPr>
+          <p:cNvPr id="3" name="Content Placeholder 2"/>
+          <p:cNvSpPr>
+            <a:spLocks noGrp="1"/>
+          </p:cNvSpPr>
+          <p:nvPr>
+            <p:ph idx="1"/>
+          </p:nvPr>
+        </p:nvSpPr>
+        <p:spPr/>
+        <p:txBody>
+          <a:bodyPr/>
+          <a:lstStyle/>
+          <a:p>
+            <a:endParaRPr lang="en-US" dirty="0"/>
+          </a:p>
+          <a:p>
+            <a:pPr lvl="1" fontAlgn="base">
+              <a:buFont typeface="Wingdings" panose="05000000000000000000" pitchFamily="2" charset="2"/>
+              <a:buChar char="q"/>
+            </a:pPr>
+            <a:r>
+              <a:rPr lang="en-US" sz="2800" dirty="0"/>
+              <a:t>A committee: </a:t>
+            </a:r>
+          </a:p>
+          <a:p>
+            <a:pPr lvl="2" fontAlgn="base">
+              <a:buFont typeface="Wingdings" panose="05000000000000000000" pitchFamily="2" charset="2"/>
+              <a:buChar char="q"/>
+            </a:pPr>
+            <a:r>
+              <a:rPr lang="en-US" sz="2000" dirty="0"/>
+              <a:t>S</a:t>
+            </a:r>
+            <a:r>
+              <a:rPr lang="en-US" sz="2000" dirty="0" smtClean="0"/>
+              <a:t>pecialists </a:t>
+            </a:r>
+            <a:r>
+              <a:rPr lang="en-US" sz="2000" dirty="0"/>
+              <a:t>in different programming languages.   </a:t>
+            </a:r>
+            <a:endParaRPr lang="en-US" sz="2000" dirty="0" smtClean="0"/>
+          </a:p>
+          <a:p>
+            <a:pPr lvl="2" fontAlgn="base">
+              <a:buFont typeface="Wingdings" panose="05000000000000000000" pitchFamily="2" charset="2"/>
+              <a:buChar char="q"/>
+            </a:pPr>
+            <a:r>
+              <a:rPr lang="en-US" sz="2000" dirty="0" smtClean="0"/>
+              <a:t>Responsible for ensuring that code passes quality tests and evaluating metadata for quality and completeness. </a:t>
+            </a:r>
+          </a:p>
+          <a:p>
+            <a:pPr lvl="2" fontAlgn="base">
+              <a:buFont typeface="Wingdings" panose="05000000000000000000" pitchFamily="2" charset="2"/>
+              <a:buChar char="q"/>
+            </a:pPr>
+            <a:r>
+              <a:rPr lang="en-US" sz="2000" dirty="0" smtClean="0"/>
+              <a:t>Distributed workload. </a:t>
+            </a:r>
+            <a:endParaRPr lang="en-US" sz="2000" dirty="0"/>
+          </a:p>
+          <a:p>
+            <a:pPr lvl="2" fontAlgn="base">
+              <a:buFont typeface="Wingdings" panose="05000000000000000000" pitchFamily="2" charset="2"/>
+              <a:buChar char="q"/>
+            </a:pPr>
+            <a:r>
+              <a:rPr lang="en-US" sz="2000" dirty="0" smtClean="0"/>
+              <a:t>Issues:</a:t>
+            </a:r>
+          </a:p>
+          <a:p>
+            <a:pPr lvl="3" fontAlgn="base">
+              <a:buFont typeface="Wingdings" panose="05000000000000000000" pitchFamily="2" charset="2"/>
+              <a:buChar char="q"/>
+            </a:pPr>
+            <a:r>
+              <a:rPr lang="en-US" sz="2000" dirty="0" smtClean="0"/>
+              <a:t>Number of members</a:t>
+            </a:r>
+          </a:p>
+          <a:p>
+            <a:pPr lvl="3" fontAlgn="base">
+              <a:buFont typeface="Wingdings" panose="05000000000000000000" pitchFamily="2" charset="2"/>
+              <a:buChar char="q"/>
+            </a:pPr>
+            <a:r>
+              <a:rPr lang="en-US" sz="2000" dirty="0" smtClean="0"/>
+              <a:t>Term of service and rotation</a:t>
+            </a:r>
+          </a:p>
+          <a:p>
+            <a:pPr lvl="3" fontAlgn="base">
+              <a:buFont typeface="Wingdings" panose="05000000000000000000" pitchFamily="2" charset="2"/>
+              <a:buChar char="q"/>
+            </a:pPr>
+            <a:r>
+              <a:rPr lang="en-US" sz="2000" dirty="0" smtClean="0"/>
+              <a:t>Credit for service</a:t>
+            </a:r>
+          </a:p>
+        </p:txBody>
+      </p:sp>
+      <p:pic>
+        <p:nvPicPr>
+          <p:cNvPr id="8" name="Picture 7"/>
+          <p:cNvPicPr>
+            <a:picLocks noChangeAspect="1"/>
+          </p:cNvPicPr>
+          <p:nvPr/>
+        </p:nvPicPr>
+        <p:blipFill>
+          <a:blip r:embed="rId2" cstate="print">
+            <a:extLst>
+              <a:ext uri="{28A0092B-C50C-407E-A947-70E740481C1C}">
+                <a14:useLocalDpi xmlns:a14="http://schemas.microsoft.com/office/drawing/2010/main" val="0"/>
+              </a:ext>
+            </a:extLst>
+          </a:blip>
+          <a:stretch>
+            <a:fillRect/>
+          </a:stretch>
+        </p:blipFill>
+        <p:spPr>
+          <a:xfrm>
+            <a:off x="10419766" y="882422"/>
+            <a:ext cx="1282139" cy="1709876"/>
+          </a:xfrm>
+          <a:prstGeom prst="rect">
+            <a:avLst/>
+          </a:prstGeom>
+        </p:spPr>
+      </p:pic>
     </p:spTree>
     <p:extLst>
       <p:ext uri="{BB962C8B-B14F-4D97-AF65-F5344CB8AC3E}">
         <p14:creationId xmlns:p14="http://schemas.microsoft.com/office/powerpoint/2010/main" val="3014254558"/>
+      </p:ext>
+    </p:extLst>
+  </p:cSld>
+  <p:clrMapOvr>
+    <a:masterClrMapping/>
+  </p:clrMapOvr>
+</p:sld>
+</file>
+
+<file path=ppt/slides/slide7.xml><?xml version="1.0" encoding="utf-8"?>
+<p:sld xmlns:a="http://schemas.openxmlformats.org/drawingml/2006/main" xmlns:r="http://schemas.openxmlformats.org/officeDocument/2006/relationships" xmlns:p="http://schemas.openxmlformats.org/presentationml/2006/main">
+  <p:cSld>
+    <p:spTree>
+      <p:nvGrpSpPr>
+        <p:cNvPr id="1" name=""/>
+        <p:cNvGrpSpPr/>
+        <p:nvPr/>
+      </p:nvGrpSpPr>
+      <p:grpSpPr>
+        <a:xfrm>
+          <a:off x="0" y="0"/>
+          <a:ext cx="0" cy="0"/>
+          <a:chOff x="0" y="0"/>
+          <a:chExt cx="0" cy="0"/>
+        </a:xfrm>
+      </p:grpSpPr>
+      <p:sp>
+        <p:nvSpPr>
+          <p:cNvPr id="2" name="Title 1"/>
+          <p:cNvSpPr>
+            <a:spLocks noGrp="1"/>
+          </p:cNvSpPr>
+          <p:nvPr>
+            <p:ph type="title"/>
+          </p:nvPr>
+        </p:nvSpPr>
+        <p:spPr/>
+        <p:txBody>
+          <a:bodyPr>
+            <a:normAutofit/>
+          </a:bodyPr>
+          <a:lstStyle/>
+          <a:p>
+            <a:r>
+              <a:rPr lang="en-US" dirty="0"/>
+              <a:t>What are the minimum requirements </a:t>
+            </a:r>
+            <a:r>
+              <a:rPr lang="en-US" dirty="0" smtClean="0"/>
+              <a:t>that a script should meet?  </a:t>
+            </a:r>
+            <a:endParaRPr lang="en-US" dirty="0"/>
+          </a:p>
+        </p:txBody>
+      </p:sp>
+      <p:sp>
+        <p:nvSpPr>
+          <p:cNvPr id="3" name="Content Placeholder 2"/>
+          <p:cNvSpPr>
+            <a:spLocks noGrp="1"/>
+          </p:cNvSpPr>
+          <p:nvPr>
+            <p:ph idx="1"/>
+          </p:nvPr>
+        </p:nvSpPr>
+        <p:spPr/>
+        <p:txBody>
+          <a:bodyPr/>
+          <a:lstStyle/>
+          <a:p>
+            <a:pPr>
+              <a:buFont typeface="Wingdings" panose="05000000000000000000" pitchFamily="2" charset="2"/>
+              <a:buChar char="q"/>
+            </a:pPr>
+            <a:r>
+              <a:rPr lang="en-US" dirty="0" smtClean="0"/>
+              <a:t>Generalized, not project specific</a:t>
+            </a:r>
+          </a:p>
+          <a:p>
+            <a:pPr>
+              <a:buFont typeface="Wingdings" panose="05000000000000000000" pitchFamily="2" charset="2"/>
+              <a:buChar char="q"/>
+            </a:pPr>
+            <a:r>
+              <a:rPr lang="en-US" dirty="0" smtClean="0"/>
+              <a:t>Well documented at the code package level and within the source code</a:t>
+            </a:r>
+          </a:p>
+          <a:p>
+            <a:pPr lvl="1">
+              <a:buFont typeface="Wingdings" panose="05000000000000000000" pitchFamily="2" charset="2"/>
+              <a:buChar char="q"/>
+            </a:pPr>
+            <a:r>
+              <a:rPr lang="en-US" dirty="0" err="1" smtClean="0"/>
+              <a:t>CodeMeta</a:t>
+            </a:r>
+            <a:r>
+              <a:rPr lang="en-US" dirty="0" smtClean="0"/>
+              <a:t> minimal metadata schema for science software and code</a:t>
+            </a:r>
+          </a:p>
+          <a:p>
+            <a:pPr lvl="1">
+              <a:buFont typeface="Wingdings" panose="05000000000000000000" pitchFamily="2" charset="2"/>
+              <a:buChar char="q"/>
+            </a:pPr>
+            <a:r>
+              <a:rPr lang="en-US" dirty="0" smtClean="0"/>
+              <a:t>Documentation of how code is installed and used</a:t>
+            </a:r>
+          </a:p>
+          <a:p>
+            <a:pPr lvl="1">
+              <a:buFont typeface="Wingdings" panose="05000000000000000000" pitchFamily="2" charset="2"/>
+              <a:buChar char="q"/>
+            </a:pPr>
+            <a:r>
+              <a:rPr lang="en-US" dirty="0" smtClean="0"/>
+              <a:t>Controlled vocabulary terms</a:t>
+            </a:r>
+          </a:p>
+          <a:p>
+            <a:pPr lvl="1">
+              <a:buFont typeface="Wingdings" panose="05000000000000000000" pitchFamily="2" charset="2"/>
+              <a:buChar char="q"/>
+            </a:pPr>
+            <a:r>
+              <a:rPr lang="en-US" dirty="0" smtClean="0"/>
+              <a:t>Code is thoroughly commented and adheres to a language-specific style guide</a:t>
+            </a:r>
+          </a:p>
+          <a:p>
+            <a:pPr>
+              <a:buFont typeface="Wingdings" panose="05000000000000000000" pitchFamily="2" charset="2"/>
+              <a:buChar char="q"/>
+            </a:pPr>
+            <a:r>
+              <a:rPr lang="en-US" dirty="0" smtClean="0"/>
+              <a:t>Pass conceptual tests and tests of the code itself</a:t>
+            </a:r>
+          </a:p>
+          <a:p>
+            <a:pPr lvl="1">
+              <a:buFont typeface="Wingdings" panose="05000000000000000000" pitchFamily="2" charset="2"/>
+              <a:buChar char="q"/>
+            </a:pPr>
+            <a:r>
+              <a:rPr lang="en-US" dirty="0" smtClean="0"/>
+              <a:t>Example data sets </a:t>
+            </a:r>
+            <a:r>
+              <a:rPr lang="en-US" dirty="0"/>
+              <a:t>and expected output (use cases</a:t>
+            </a:r>
+            <a:r>
+              <a:rPr lang="en-US" dirty="0" smtClean="0"/>
+              <a:t>)</a:t>
+            </a:r>
+          </a:p>
+          <a:p>
+            <a:pPr lvl="1">
+              <a:buFont typeface="Wingdings" panose="05000000000000000000" pitchFamily="2" charset="2"/>
+              <a:buChar char="q"/>
+            </a:pPr>
+            <a:r>
+              <a:rPr lang="en-US" dirty="0" smtClean="0"/>
+              <a:t>Provides meaningful error messages</a:t>
+            </a:r>
+          </a:p>
+          <a:p>
+            <a:pPr>
+              <a:buFont typeface="Wingdings" panose="05000000000000000000" pitchFamily="2" charset="2"/>
+              <a:buChar char="q"/>
+            </a:pPr>
+            <a:endParaRPr lang="en-US" dirty="0" smtClean="0"/>
+          </a:p>
+          <a:p>
+            <a:pPr marL="201168" lvl="1" indent="0">
+              <a:buNone/>
+            </a:pPr>
+            <a:endParaRPr lang="en-US" dirty="0"/>
+          </a:p>
+        </p:txBody>
+      </p:sp>
+      <p:pic>
+        <p:nvPicPr>
+          <p:cNvPr id="5" name="Picture 4"/>
+          <p:cNvPicPr>
+            <a:picLocks noChangeAspect="1"/>
+          </p:cNvPicPr>
+          <p:nvPr/>
+        </p:nvPicPr>
+        <p:blipFill>
+          <a:blip r:embed="rId2">
+            <a:extLst>
+              <a:ext uri="{28A0092B-C50C-407E-A947-70E740481C1C}">
+                <a14:useLocalDpi xmlns:a14="http://schemas.microsoft.com/office/drawing/2010/main" val="0"/>
+              </a:ext>
+            </a:extLst>
+          </a:blip>
+          <a:stretch>
+            <a:fillRect/>
+          </a:stretch>
+        </p:blipFill>
+        <p:spPr>
+          <a:xfrm>
+            <a:off x="9742818" y="2480344"/>
+            <a:ext cx="2075372" cy="1377070"/>
+          </a:xfrm>
+          <a:prstGeom prst="rect">
+            <a:avLst/>
+          </a:prstGeom>
+        </p:spPr>
+      </p:pic>
+    </p:spTree>
+    <p:extLst>
+      <p:ext uri="{BB962C8B-B14F-4D97-AF65-F5344CB8AC3E}">
+        <p14:creationId xmlns:p14="http://schemas.microsoft.com/office/powerpoint/2010/main" val="463228703"/>
+      </p:ext>
+    </p:extLst>
+  </p:cSld>
+  <p:clrMapOvr>
+    <a:masterClrMapping/>
+  </p:clrMapOvr>
+</p:sld>
+</file>
+
+<file path=ppt/slides/slide8.xml><?xml version="1.0" encoding="utf-8"?>
+<p:sld xmlns:a="http://schemas.openxmlformats.org/drawingml/2006/main" xmlns:r="http://schemas.openxmlformats.org/officeDocument/2006/relationships" xmlns:p="http://schemas.openxmlformats.org/presentationml/2006/main">
+  <p:cSld>
+    <p:spTree>
+      <p:nvGrpSpPr>
+        <p:cNvPr id="1" name=""/>
+        <p:cNvGrpSpPr/>
+        <p:nvPr/>
+      </p:nvGrpSpPr>
+      <p:grpSpPr>
+        <a:xfrm>
+          <a:off x="0" y="0"/>
+          <a:ext cx="0" cy="0"/>
+          <a:chOff x="0" y="0"/>
+          <a:chExt cx="0" cy="0"/>
+        </a:xfrm>
+      </p:grpSpPr>
+      <p:sp>
+        <p:nvSpPr>
+          <p:cNvPr id="2" name="Title 1"/>
+          <p:cNvSpPr>
+            <a:spLocks noGrp="1"/>
+          </p:cNvSpPr>
+          <p:nvPr>
+            <p:ph type="title"/>
+          </p:nvPr>
+        </p:nvSpPr>
+        <p:spPr/>
+        <p:txBody>
+          <a:bodyPr/>
+          <a:lstStyle/>
+          <a:p>
+            <a:r>
+              <a:rPr lang="en-US" dirty="0" smtClean="0"/>
+              <a:t>Other considerations</a:t>
+            </a:r>
+            <a:endParaRPr lang="en-US" dirty="0"/>
+          </a:p>
+        </p:txBody>
+      </p:sp>
+      <p:sp>
+        <p:nvSpPr>
+          <p:cNvPr id="3" name="Content Placeholder 2"/>
+          <p:cNvSpPr>
+            <a:spLocks noGrp="1"/>
+          </p:cNvSpPr>
+          <p:nvPr>
+            <p:ph idx="1"/>
+          </p:nvPr>
+        </p:nvSpPr>
+        <p:spPr/>
+        <p:txBody>
+          <a:bodyPr/>
+          <a:lstStyle/>
+          <a:p>
+            <a:pPr>
+              <a:buFont typeface="Wingdings" panose="05000000000000000000" pitchFamily="2" charset="2"/>
+              <a:buChar char="q"/>
+            </a:pPr>
+            <a:r>
+              <a:rPr lang="en-US" dirty="0" smtClean="0"/>
+              <a:t>Incentives to contribute to repository</a:t>
+            </a:r>
+          </a:p>
+          <a:p>
+            <a:pPr>
+              <a:buFont typeface="Wingdings" panose="05000000000000000000" pitchFamily="2" charset="2"/>
+              <a:buChar char="q"/>
+            </a:pPr>
+            <a:r>
+              <a:rPr lang="en-US" dirty="0" smtClean="0"/>
+              <a:t>Maintenance/updates of code</a:t>
+            </a:r>
+          </a:p>
+          <a:p>
+            <a:pPr>
+              <a:buFont typeface="Wingdings" panose="05000000000000000000" pitchFamily="2" charset="2"/>
+              <a:buChar char="q"/>
+            </a:pPr>
+            <a:r>
+              <a:rPr lang="en-US" dirty="0" smtClean="0"/>
+              <a:t>User Support</a:t>
+            </a:r>
+          </a:p>
+          <a:p>
+            <a:pPr>
+              <a:buFont typeface="Wingdings" panose="05000000000000000000" pitchFamily="2" charset="2"/>
+              <a:buChar char="q"/>
+            </a:pPr>
+            <a:r>
+              <a:rPr lang="en-US" dirty="0" smtClean="0"/>
+              <a:t>Licensing</a:t>
+            </a:r>
+          </a:p>
+          <a:p>
+            <a:pPr marL="0" indent="0">
+              <a:buNone/>
+            </a:pPr>
+            <a:endParaRPr lang="en-US" dirty="0" smtClean="0"/>
+          </a:p>
+          <a:p>
+            <a:pPr>
+              <a:buFont typeface="Wingdings" panose="05000000000000000000" pitchFamily="2" charset="2"/>
+              <a:buChar char="q"/>
+            </a:pPr>
+            <a:endParaRPr lang="en-US" dirty="0"/>
+          </a:p>
+        </p:txBody>
+      </p:sp>
+      <p:pic>
+        <p:nvPicPr>
+          <p:cNvPr id="5" name="Picture 4"/>
+          <p:cNvPicPr>
+            <a:picLocks noChangeAspect="1"/>
+          </p:cNvPicPr>
+          <p:nvPr/>
+        </p:nvPicPr>
+        <p:blipFill>
+          <a:blip r:embed="rId2">
+            <a:extLst>
+              <a:ext uri="{28A0092B-C50C-407E-A947-70E740481C1C}">
+                <a14:useLocalDpi xmlns:a14="http://schemas.microsoft.com/office/drawing/2010/main" val="0"/>
+              </a:ext>
+            </a:extLst>
+          </a:blip>
+          <a:stretch>
+            <a:fillRect/>
+          </a:stretch>
+        </p:blipFill>
+        <p:spPr>
+          <a:xfrm>
+            <a:off x="8294747" y="2042124"/>
+            <a:ext cx="2124075" cy="2152650"/>
+          </a:xfrm>
+          <a:prstGeom prst="rect">
+            <a:avLst/>
+          </a:prstGeom>
+        </p:spPr>
+      </p:pic>
+      <p:pic>
+        <p:nvPicPr>
+          <p:cNvPr id="6" name="Picture 5"/>
+          <p:cNvPicPr>
+            <a:picLocks noChangeAspect="1"/>
+          </p:cNvPicPr>
+          <p:nvPr/>
+        </p:nvPicPr>
+        <p:blipFill>
+          <a:blip r:embed="rId3" cstate="print">
+            <a:extLst>
+              <a:ext uri="{28A0092B-C50C-407E-A947-70E740481C1C}">
+                <a14:useLocalDpi xmlns:a14="http://schemas.microsoft.com/office/drawing/2010/main" val="0"/>
+              </a:ext>
+            </a:extLst>
+          </a:blip>
+          <a:stretch>
+            <a:fillRect/>
+          </a:stretch>
+        </p:blipFill>
+        <p:spPr>
+          <a:xfrm>
+            <a:off x="5731462" y="4492206"/>
+            <a:ext cx="1396401" cy="1675681"/>
+          </a:xfrm>
+          <a:prstGeom prst="rect">
+            <a:avLst/>
+          </a:prstGeom>
+        </p:spPr>
+      </p:pic>
+    </p:spTree>
+    <p:extLst>
+      <p:ext uri="{BB962C8B-B14F-4D97-AF65-F5344CB8AC3E}">
+        <p14:creationId xmlns:p14="http://schemas.microsoft.com/office/powerpoint/2010/main" val="2378656470"/>
+      </p:ext>
+    </p:extLst>
+  </p:cSld>
+  <p:clrMapOvr>
+    <a:masterClrMapping/>
+  </p:clrMapOvr>
+</p:sld>
+</file>
+
+<file path=ppt/slides/slide9.xml><?xml version="1.0" encoding="utf-8"?>
+<p:sld xmlns:a="http://schemas.openxmlformats.org/drawingml/2006/main" xmlns:r="http://schemas.openxmlformats.org/officeDocument/2006/relationships" xmlns:p="http://schemas.openxmlformats.org/presentationml/2006/main">
+  <p:cSld>
+    <p:spTree>
+      <p:nvGrpSpPr>
+        <p:cNvPr id="1" name=""/>
+        <p:cNvGrpSpPr/>
+        <p:nvPr/>
+      </p:nvGrpSpPr>
+      <p:grpSpPr>
+        <a:xfrm>
+          <a:off x="0" y="0"/>
+          <a:ext cx="0" cy="0"/>
+          <a:chOff x="0" y="0"/>
+          <a:chExt cx="0" cy="0"/>
+        </a:xfrm>
+      </p:grpSpPr>
+      <p:sp>
+        <p:nvSpPr>
+          <p:cNvPr id="2" name="Title 1"/>
+          <p:cNvSpPr>
+            <a:spLocks noGrp="1"/>
+          </p:cNvSpPr>
+          <p:nvPr>
+            <p:ph type="title"/>
+          </p:nvPr>
+        </p:nvSpPr>
+        <p:spPr/>
+        <p:txBody>
+          <a:bodyPr/>
+          <a:lstStyle/>
+          <a:p>
+            <a:r>
+              <a:rPr lang="en-US" dirty="0" smtClean="0"/>
+              <a:t>Join us to finish the IM Repository blueprint!</a:t>
+            </a:r>
+            <a:endParaRPr lang="en-US" dirty="0"/>
+          </a:p>
+        </p:txBody>
+      </p:sp>
+      <p:sp>
+        <p:nvSpPr>
+          <p:cNvPr id="3" name="Content Placeholder 2"/>
+          <p:cNvSpPr>
+            <a:spLocks noGrp="1"/>
+          </p:cNvSpPr>
+          <p:nvPr>
+            <p:ph idx="1"/>
+          </p:nvPr>
+        </p:nvSpPr>
+        <p:spPr/>
+        <p:txBody>
+          <a:bodyPr/>
+          <a:lstStyle/>
+          <a:p>
+            <a:pPr>
+              <a:buFont typeface="Wingdings" panose="05000000000000000000" pitchFamily="2" charset="2"/>
+              <a:buChar char="q"/>
+            </a:pPr>
+            <a:r>
+              <a:rPr lang="en-US" dirty="0" smtClean="0"/>
+              <a:t>Volunteers sought to co-author and review the ‘blueprint’ once we have assembled it.</a:t>
+            </a:r>
+            <a:endParaRPr lang="en-US" dirty="0"/>
+          </a:p>
+        </p:txBody>
+      </p:sp>
+      <p:pic>
+        <p:nvPicPr>
+          <p:cNvPr id="4" name="Picture 3"/>
+          <p:cNvPicPr>
+            <a:picLocks noChangeAspect="1"/>
+          </p:cNvPicPr>
+          <p:nvPr/>
+        </p:nvPicPr>
+        <p:blipFill>
+          <a:blip r:embed="rId2">
+            <a:extLst>
+              <a:ext uri="{28A0092B-C50C-407E-A947-70E740481C1C}">
+                <a14:useLocalDpi xmlns:a14="http://schemas.microsoft.com/office/drawing/2010/main" val="0"/>
+              </a:ext>
+            </a:extLst>
+          </a:blip>
+          <a:stretch>
+            <a:fillRect/>
+          </a:stretch>
+        </p:blipFill>
+        <p:spPr>
+          <a:xfrm>
+            <a:off x="698739" y="2912781"/>
+            <a:ext cx="2212748" cy="2212748"/>
+          </a:xfrm>
+          <a:prstGeom prst="rect">
+            <a:avLst/>
+          </a:prstGeom>
+        </p:spPr>
+      </p:pic>
+    </p:spTree>
+    <p:extLst>
+      <p:ext uri="{BB962C8B-B14F-4D97-AF65-F5344CB8AC3E}">
+        <p14:creationId xmlns:p14="http://schemas.microsoft.com/office/powerpoint/2010/main" val="2469712582"/>
       </p:ext>
     </p:extLst>
   </p:cSld>

</xml_diff>

<commit_message>
Changes made to several slides#
</commit_message>
<xml_diff>
--- a/Building an Information Management Code Library.pptx
+++ b/Building an Information Management Code Library.pptx
@@ -7,13 +7,14 @@
   <p:sldIdLst>
     <p:sldId id="256" r:id="rId2"/>
     <p:sldId id="262" r:id="rId3"/>
-    <p:sldId id="258" r:id="rId4"/>
+    <p:sldId id="266" r:id="rId4"/>
     <p:sldId id="265" r:id="rId5"/>
     <p:sldId id="259" r:id="rId6"/>
     <p:sldId id="261" r:id="rId7"/>
     <p:sldId id="260" r:id="rId8"/>
-    <p:sldId id="264" r:id="rId9"/>
-    <p:sldId id="263" r:id="rId10"/>
+    <p:sldId id="267" r:id="rId9"/>
+    <p:sldId id="264" r:id="rId10"/>
+    <p:sldId id="263" r:id="rId11"/>
   </p:sldIdLst>
   <p:sldSz cx="12192000" cy="6858000"/>
   <p:notesSz cx="6858000" cy="9144000"/>
@@ -346,7 +347,7 @@
           <a:p>
             <a:fld id="{CA364462-489C-44DB-9AFB-A6D942F03258}" type="datetimeFigureOut">
               <a:rPr lang="en-US" smtClean="0"/>
-              <a:t>7/13/2017</a:t>
+              <a:t>7/19/2017</a:t>
             </a:fld>
             <a:endParaRPr lang="en-US"/>
           </a:p>
@@ -588,7 +589,7 @@
           <a:p>
             <a:fld id="{CA364462-489C-44DB-9AFB-A6D942F03258}" type="datetimeFigureOut">
               <a:rPr lang="en-US" smtClean="0"/>
-              <a:t>7/13/2017</a:t>
+              <a:t>7/19/2017</a:t>
             </a:fld>
             <a:endParaRPr lang="en-US"/>
           </a:p>
@@ -844,7 +845,7 @@
           <a:p>
             <a:fld id="{CA364462-489C-44DB-9AFB-A6D942F03258}" type="datetimeFigureOut">
               <a:rPr lang="en-US" smtClean="0"/>
-              <a:t>7/13/2017</a:t>
+              <a:t>7/19/2017</a:t>
             </a:fld>
             <a:endParaRPr lang="en-US"/>
           </a:p>
@@ -1018,7 +1019,7 @@
           <a:p>
             <a:fld id="{CA364462-489C-44DB-9AFB-A6D942F03258}" type="datetimeFigureOut">
               <a:rPr lang="en-US" smtClean="0"/>
-              <a:t>7/13/2017</a:t>
+              <a:t>7/19/2017</a:t>
             </a:fld>
             <a:endParaRPr lang="en-US"/>
           </a:p>
@@ -1395,7 +1396,7 @@
           <a:p>
             <a:fld id="{CA364462-489C-44DB-9AFB-A6D942F03258}" type="datetimeFigureOut">
               <a:rPr lang="en-US" smtClean="0"/>
-              <a:t>7/13/2017</a:t>
+              <a:t>7/19/2017</a:t>
             </a:fld>
             <a:endParaRPr lang="en-US"/>
           </a:p>
@@ -1670,7 +1671,7 @@
           <a:p>
             <a:fld id="{CA364462-489C-44DB-9AFB-A6D942F03258}" type="datetimeFigureOut">
               <a:rPr lang="en-US" smtClean="0"/>
-              <a:t>7/13/2017</a:t>
+              <a:t>7/19/2017</a:t>
             </a:fld>
             <a:endParaRPr lang="en-US"/>
           </a:p>
@@ -2049,7 +2050,7 @@
           <a:p>
             <a:fld id="{CA364462-489C-44DB-9AFB-A6D942F03258}" type="datetimeFigureOut">
               <a:rPr lang="en-US" smtClean="0"/>
-              <a:t>7/13/2017</a:t>
+              <a:t>7/19/2017</a:t>
             </a:fld>
             <a:endParaRPr lang="en-US"/>
           </a:p>
@@ -2167,7 +2168,7 @@
           <a:p>
             <a:fld id="{CA364462-489C-44DB-9AFB-A6D942F03258}" type="datetimeFigureOut">
               <a:rPr lang="en-US" smtClean="0"/>
-              <a:t>7/13/2017</a:t>
+              <a:t>7/19/2017</a:t>
             </a:fld>
             <a:endParaRPr lang="en-US"/>
           </a:p>
@@ -2338,7 +2339,7 @@
           <a:p>
             <a:fld id="{CA364462-489C-44DB-9AFB-A6D942F03258}" type="datetimeFigureOut">
               <a:rPr lang="en-US" smtClean="0"/>
-              <a:t>7/13/2017</a:t>
+              <a:t>7/19/2017</a:t>
             </a:fld>
             <a:endParaRPr lang="en-US"/>
           </a:p>
@@ -2692,7 +2693,7 @@
           <a:p>
             <a:fld id="{CA364462-489C-44DB-9AFB-A6D942F03258}" type="datetimeFigureOut">
               <a:rPr lang="en-US" smtClean="0"/>
-              <a:t>7/13/2017</a:t>
+              <a:t>7/19/2017</a:t>
             </a:fld>
             <a:endParaRPr lang="en-US"/>
           </a:p>
@@ -3074,7 +3075,7 @@
           <a:p>
             <a:fld id="{CA364462-489C-44DB-9AFB-A6D942F03258}" type="datetimeFigureOut">
               <a:rPr lang="en-US" smtClean="0"/>
-              <a:t>7/13/2017</a:t>
+              <a:t>7/19/2017</a:t>
             </a:fld>
             <a:endParaRPr lang="en-US"/>
           </a:p>
@@ -3361,7 +3362,7 @@
           <a:p>
             <a:fld id="{CA364462-489C-44DB-9AFB-A6D942F03258}" type="datetimeFigureOut">
               <a:rPr lang="en-US" smtClean="0"/>
-              <a:t>7/13/2017</a:t>
+              <a:t>7/19/2017</a:t>
             </a:fld>
             <a:endParaRPr lang="en-US"/>
           </a:p>
@@ -3962,6 +3963,127 @@
   <p:clrMapOvr>
     <a:masterClrMapping/>
   </p:clrMapOvr>
+  <p:timing>
+    <p:tnLst>
+      <p:par>
+        <p:cTn id="1" dur="indefinite" restart="never" nodeType="tmRoot"/>
+      </p:par>
+    </p:tnLst>
+  </p:timing>
+</p:sld>
+</file>
+
+<file path=ppt/slides/slide10.xml><?xml version="1.0" encoding="utf-8"?>
+<p:sld xmlns:a="http://schemas.openxmlformats.org/drawingml/2006/main" xmlns:r="http://schemas.openxmlformats.org/officeDocument/2006/relationships" xmlns:p="http://schemas.openxmlformats.org/presentationml/2006/main">
+  <p:cSld>
+    <p:spTree>
+      <p:nvGrpSpPr>
+        <p:cNvPr id="1" name=""/>
+        <p:cNvGrpSpPr/>
+        <p:nvPr/>
+      </p:nvGrpSpPr>
+      <p:grpSpPr>
+        <a:xfrm>
+          <a:off x="0" y="0"/>
+          <a:ext cx="0" cy="0"/>
+          <a:chOff x="0" y="0"/>
+          <a:chExt cx="0" cy="0"/>
+        </a:xfrm>
+      </p:grpSpPr>
+      <p:sp>
+        <p:nvSpPr>
+          <p:cNvPr id="2" name="Title 1"/>
+          <p:cNvSpPr>
+            <a:spLocks noGrp="1"/>
+          </p:cNvSpPr>
+          <p:nvPr>
+            <p:ph type="title"/>
+          </p:nvPr>
+        </p:nvSpPr>
+        <p:spPr/>
+        <p:txBody>
+          <a:bodyPr/>
+          <a:lstStyle/>
+          <a:p>
+            <a:r>
+              <a:rPr lang="en-US" dirty="0" smtClean="0"/>
+              <a:t>Join us to finish the IM Repository blueprint!</a:t>
+            </a:r>
+            <a:endParaRPr lang="en-US" dirty="0"/>
+          </a:p>
+        </p:txBody>
+      </p:sp>
+      <p:sp>
+        <p:nvSpPr>
+          <p:cNvPr id="3" name="Content Placeholder 2"/>
+          <p:cNvSpPr>
+            <a:spLocks noGrp="1"/>
+          </p:cNvSpPr>
+          <p:nvPr>
+            <p:ph idx="1"/>
+          </p:nvPr>
+        </p:nvSpPr>
+        <p:spPr/>
+        <p:txBody>
+          <a:bodyPr/>
+          <a:lstStyle/>
+          <a:p>
+            <a:pPr>
+              <a:buFont typeface="Wingdings" panose="05000000000000000000" pitchFamily="2" charset="2"/>
+              <a:buChar char="q"/>
+            </a:pPr>
+            <a:r>
+              <a:rPr lang="en-US" dirty="0" smtClean="0"/>
+              <a:t>Volunteers sought to co-author and review the ‘blueprint</a:t>
+            </a:r>
+            <a:r>
+              <a:rPr lang="en-US" dirty="0" smtClean="0"/>
+              <a:t>’</a:t>
+            </a:r>
+            <a:endParaRPr lang="en-US" dirty="0"/>
+          </a:p>
+        </p:txBody>
+      </p:sp>
+      <p:pic>
+        <p:nvPicPr>
+          <p:cNvPr id="4" name="Picture 3"/>
+          <p:cNvPicPr>
+            <a:picLocks noChangeAspect="1"/>
+          </p:cNvPicPr>
+          <p:nvPr/>
+        </p:nvPicPr>
+        <p:blipFill>
+          <a:blip r:embed="rId2">
+            <a:extLst>
+              <a:ext uri="{28A0092B-C50C-407E-A947-70E740481C1C}">
+                <a14:useLocalDpi xmlns:a14="http://schemas.microsoft.com/office/drawing/2010/main" val="0"/>
+              </a:ext>
+            </a:extLst>
+          </a:blip>
+          <a:stretch>
+            <a:fillRect/>
+          </a:stretch>
+        </p:blipFill>
+        <p:spPr>
+          <a:xfrm>
+            <a:off x="698739" y="2912781"/>
+            <a:ext cx="2212748" cy="2212748"/>
+          </a:xfrm>
+          <a:prstGeom prst="rect">
+            <a:avLst/>
+          </a:prstGeom>
+        </p:spPr>
+      </p:pic>
+    </p:spTree>
+    <p:extLst>
+      <p:ext uri="{BB962C8B-B14F-4D97-AF65-F5344CB8AC3E}">
+        <p14:creationId xmlns:p14="http://schemas.microsoft.com/office/powerpoint/2010/main" val="2469712582"/>
+      </p:ext>
+    </p:extLst>
+  </p:cSld>
+  <p:clrMapOvr>
+    <a:masterClrMapping/>
+  </p:clrMapOvr>
 </p:sld>
 </file>
 
@@ -4026,7 +4148,27 @@
             </a:pPr>
             <a:r>
               <a:rPr lang="en-US" dirty="0" smtClean="0"/>
-              <a:t>A place to go for information management code solutions</a:t>
+              <a:t>A </a:t>
+            </a:r>
+            <a:r>
+              <a:rPr lang="en-US" dirty="0" smtClean="0"/>
+              <a:t>community space </a:t>
+            </a:r>
+            <a:r>
+              <a:rPr lang="en-US" dirty="0" smtClean="0"/>
+              <a:t>where </a:t>
+            </a:r>
+            <a:r>
+              <a:rPr lang="en-US" dirty="0" smtClean="0"/>
+              <a:t>participants </a:t>
+            </a:r>
+            <a:r>
+              <a:rPr lang="en-US" dirty="0" smtClean="0"/>
+              <a:t>contribute code and discover code to </a:t>
+            </a:r>
+            <a:r>
+              <a:rPr lang="en-US" dirty="0" smtClean="0"/>
+              <a:t>re-use</a:t>
             </a:r>
           </a:p>
           <a:p>
@@ -4036,7 +4178,7 @@
             </a:pPr>
             <a:r>
               <a:rPr lang="en-US" dirty="0" smtClean="0"/>
-              <a:t>A community space, where IM community participants contribute code and discover code to re-use</a:t>
+              <a:t>For Information Managers, scientists, students, others</a:t>
             </a:r>
           </a:p>
           <a:p>
@@ -4046,20 +4188,235 @@
             </a:pPr>
             <a:r>
               <a:rPr lang="en-US" dirty="0" smtClean="0"/>
-              <a:t>Our goal today is to create a </a:t>
-            </a:r>
-            <a:r>
-              <a:rPr lang="en-US" i="1" dirty="0" smtClean="0"/>
-              <a:t>blueprint</a:t>
-            </a:r>
+              <a:t>Limited to code for IM tasks</a:t>
+            </a:r>
+          </a:p>
+          <a:p>
+            <a:pPr>
+              <a:buFont typeface="Wingdings" panose="05000000000000000000" pitchFamily="2" charset="2"/>
+              <a:buChar char="q"/>
+            </a:pPr>
             <a:r>
               <a:rPr lang="en-US" dirty="0" smtClean="0"/>
-              <a:t> for how the IM code repository will operate</a:t>
-            </a:r>
-            <a:endParaRPr lang="en-US" dirty="0"/>
-          </a:p>
-        </p:txBody>
-      </p:sp>
+              <a:t>Language agnostic</a:t>
+            </a:r>
+          </a:p>
+          <a:p>
+            <a:pPr>
+              <a:buFont typeface="Wingdings" panose="05000000000000000000" pitchFamily="2" charset="2"/>
+              <a:buChar char="q"/>
+            </a:pPr>
+            <a:endParaRPr lang="en-US" dirty="0" smtClean="0"/>
+          </a:p>
+          <a:p>
+            <a:pPr lvl="1">
+              <a:buFont typeface="Wingdings" panose="05000000000000000000" pitchFamily="2" charset="2"/>
+              <a:buChar char="q"/>
+            </a:pPr>
+            <a:endParaRPr lang="en-US" dirty="0" smtClean="0"/>
+          </a:p>
+          <a:p>
+            <a:pPr lvl="1">
+              <a:buFont typeface="Wingdings" panose="05000000000000000000" pitchFamily="2" charset="2"/>
+              <a:buChar char="q"/>
+            </a:pPr>
+            <a:endParaRPr lang="en-US" dirty="0" smtClean="0"/>
+          </a:p>
+          <a:p>
+            <a:pPr lvl="1">
+              <a:buFont typeface="Wingdings" panose="05000000000000000000" pitchFamily="2" charset="2"/>
+              <a:buChar char="q"/>
+            </a:pPr>
+            <a:endParaRPr lang="en-US" dirty="0" smtClean="0"/>
+          </a:p>
+          <a:p>
+            <a:pPr marL="201168" lvl="1" indent="0">
+              <a:buNone/>
+            </a:pPr>
+            <a:endParaRPr lang="en-US" dirty="0" smtClean="0"/>
+          </a:p>
+        </p:txBody>
+      </p:sp>
+      <p:pic>
+        <p:nvPicPr>
+          <p:cNvPr id="5" name="Picture 4"/>
+          <p:cNvPicPr>
+            <a:picLocks noChangeAspect="1"/>
+          </p:cNvPicPr>
+          <p:nvPr/>
+        </p:nvPicPr>
+        <p:blipFill>
+          <a:blip r:embed="rId2" cstate="print">
+            <a:extLst>
+              <a:ext uri="{28A0092B-C50C-407E-A947-70E740481C1C}">
+                <a14:useLocalDpi xmlns:a14="http://schemas.microsoft.com/office/drawing/2010/main" val="0"/>
+              </a:ext>
+            </a:extLst>
+          </a:blip>
+          <a:stretch>
+            <a:fillRect/>
+          </a:stretch>
+        </p:blipFill>
+        <p:spPr>
+          <a:xfrm>
+            <a:off x="7411567" y="2738684"/>
+            <a:ext cx="1871220" cy="1865462"/>
+          </a:xfrm>
+          <a:prstGeom prst="rect">
+            <a:avLst/>
+          </a:prstGeom>
+        </p:spPr>
+      </p:pic>
+      <p:pic>
+        <p:nvPicPr>
+          <p:cNvPr id="6" name="Picture 5"/>
+          <p:cNvPicPr>
+            <a:picLocks noChangeAspect="1"/>
+          </p:cNvPicPr>
+          <p:nvPr/>
+        </p:nvPicPr>
+        <p:blipFill>
+          <a:blip r:embed="rId3" cstate="print">
+            <a:extLst>
+              <a:ext uri="{28A0092B-C50C-407E-A947-70E740481C1C}">
+                <a14:useLocalDpi xmlns:a14="http://schemas.microsoft.com/office/drawing/2010/main" val="0"/>
+              </a:ext>
+            </a:extLst>
+          </a:blip>
+          <a:stretch>
+            <a:fillRect/>
+          </a:stretch>
+        </p:blipFill>
+        <p:spPr>
+          <a:xfrm>
+            <a:off x="6394812" y="4076355"/>
+            <a:ext cx="1081537" cy="1068152"/>
+          </a:xfrm>
+          <a:prstGeom prst="rect">
+            <a:avLst/>
+          </a:prstGeom>
+        </p:spPr>
+      </p:pic>
+      <p:grpSp>
+        <p:nvGrpSpPr>
+          <p:cNvPr id="7" name="Group 6"/>
+          <p:cNvGrpSpPr/>
+          <p:nvPr/>
+        </p:nvGrpSpPr>
+        <p:grpSpPr>
+          <a:xfrm>
+            <a:off x="1234946" y="4021132"/>
+            <a:ext cx="2562073" cy="1956336"/>
+            <a:chOff x="1202862" y="4021132"/>
+            <a:chExt cx="2562073" cy="1956336"/>
+          </a:xfrm>
+        </p:grpSpPr>
+        <p:grpSp>
+          <p:nvGrpSpPr>
+            <p:cNvPr id="8" name="Group 7"/>
+            <p:cNvGrpSpPr/>
+            <p:nvPr/>
+          </p:nvGrpSpPr>
+          <p:grpSpPr>
+            <a:xfrm>
+              <a:off x="1202862" y="4129506"/>
+              <a:ext cx="2078824" cy="1847962"/>
+              <a:chOff x="1202862" y="4129506"/>
+              <a:chExt cx="2078824" cy="1847962"/>
+            </a:xfrm>
+          </p:grpSpPr>
+          <p:pic>
+            <p:nvPicPr>
+              <p:cNvPr id="10" name="Picture 9"/>
+              <p:cNvPicPr>
+                <a:picLocks noChangeAspect="1"/>
+              </p:cNvPicPr>
+              <p:nvPr/>
+            </p:nvPicPr>
+            <p:blipFill>
+              <a:blip r:embed="rId4">
+                <a:extLst>
+                  <a:ext uri="{28A0092B-C50C-407E-A947-70E740481C1C}">
+                    <a14:useLocalDpi xmlns:a14="http://schemas.microsoft.com/office/drawing/2010/main" val="0"/>
+                  </a:ext>
+                </a:extLst>
+              </a:blip>
+              <a:stretch>
+                <a:fillRect/>
+              </a:stretch>
+            </p:blipFill>
+            <p:spPr>
+              <a:xfrm>
+                <a:off x="1202862" y="4868460"/>
+                <a:ext cx="1121341" cy="986948"/>
+              </a:xfrm>
+              <a:prstGeom prst="rect">
+                <a:avLst/>
+              </a:prstGeom>
+            </p:spPr>
+          </p:pic>
+          <p:pic>
+            <p:nvPicPr>
+              <p:cNvPr id="11" name="Picture 10"/>
+              <p:cNvPicPr>
+                <a:picLocks noChangeAspect="1"/>
+              </p:cNvPicPr>
+              <p:nvPr/>
+            </p:nvPicPr>
+            <p:blipFill>
+              <a:blip r:embed="rId5" cstate="print">
+                <a:extLst>
+                  <a:ext uri="{28A0092B-C50C-407E-A947-70E740481C1C}">
+                    <a14:useLocalDpi xmlns:a14="http://schemas.microsoft.com/office/drawing/2010/main" val="0"/>
+                  </a:ext>
+                </a:extLst>
+              </a:blip>
+              <a:stretch>
+                <a:fillRect/>
+              </a:stretch>
+            </p:blipFill>
+            <p:spPr>
+              <a:xfrm>
+                <a:off x="1836485" y="4129506"/>
+                <a:ext cx="1445201" cy="1847962"/>
+              </a:xfrm>
+              <a:prstGeom prst="rect">
+                <a:avLst/>
+              </a:prstGeom>
+            </p:spPr>
+          </p:pic>
+        </p:grpSp>
+        <p:pic>
+          <p:nvPicPr>
+            <p:cNvPr id="9" name="Picture 8"/>
+            <p:cNvPicPr>
+              <a:picLocks noChangeAspect="1"/>
+            </p:cNvPicPr>
+            <p:nvPr/>
+          </p:nvPicPr>
+          <p:blipFill>
+            <a:blip r:embed="rId6" cstate="print">
+              <a:extLst>
+                <a:ext uri="{28A0092B-C50C-407E-A947-70E740481C1C}">
+                  <a14:useLocalDpi xmlns:a14="http://schemas.microsoft.com/office/drawing/2010/main" val="0"/>
+                </a:ext>
+              </a:extLst>
+            </a:blip>
+            <a:stretch>
+              <a:fillRect/>
+            </a:stretch>
+          </p:blipFill>
+          <p:spPr>
+            <a:xfrm>
+              <a:off x="2850533" y="4021132"/>
+              <a:ext cx="914402" cy="694945"/>
+            </a:xfrm>
+            <a:prstGeom prst="rect">
+              <a:avLst/>
+            </a:prstGeom>
+          </p:spPr>
+        </p:pic>
+      </p:grpSp>
     </p:spTree>
     <p:extLst>
       <p:ext uri="{BB962C8B-B14F-4D97-AF65-F5344CB8AC3E}">
@@ -4070,6 +4427,13 @@
   <p:clrMapOvr>
     <a:masterClrMapping/>
   </p:clrMapOvr>
+  <p:timing>
+    <p:tnLst>
+      <p:par>
+        <p:cTn id="1" dur="indefinite" restart="never" nodeType="tmRoot"/>
+      </p:par>
+    </p:tnLst>
+  </p:timing>
 </p:sld>
 </file>
 
@@ -4107,7 +4471,7 @@
           <a:p>
             <a:r>
               <a:rPr lang="en-US" dirty="0" smtClean="0"/>
-              <a:t>Our vision</a:t>
+              <a:t>Our goal today…</a:t>
             </a:r>
             <a:endParaRPr lang="en-US" dirty="0"/>
           </a:p>
@@ -4128,56 +4492,24 @@
           <a:bodyPr/>
           <a:lstStyle/>
           <a:p>
-            <a:pPr>
-              <a:buFont typeface="Wingdings" panose="05000000000000000000" pitchFamily="2" charset="2"/>
-              <a:buChar char="q"/>
-            </a:pPr>
             <a:r>
               <a:rPr lang="en-US" dirty="0" smtClean="0"/>
-              <a:t>Contributors/users </a:t>
-            </a:r>
-            <a:r>
-              <a:rPr lang="en-US" dirty="0" smtClean="0"/>
-              <a:t>of this </a:t>
-            </a:r>
-            <a:r>
-              <a:rPr lang="en-US" dirty="0" smtClean="0"/>
-              <a:t>repository</a:t>
-            </a:r>
-            <a:endParaRPr lang="en-US" dirty="0" smtClean="0"/>
-          </a:p>
-          <a:p>
-            <a:pPr>
-              <a:buFont typeface="Wingdings" panose="05000000000000000000" pitchFamily="2" charset="2"/>
-              <a:buChar char="q"/>
-            </a:pPr>
+              <a:t>…is </a:t>
+            </a:r>
             <a:r>
               <a:rPr lang="en-US" dirty="0"/>
-              <a:t>R</a:t>
-            </a:r>
-            <a:r>
-              <a:rPr lang="en-US" dirty="0" smtClean="0"/>
-              <a:t>ange </a:t>
-            </a:r>
-            <a:r>
-              <a:rPr lang="en-US" dirty="0" smtClean="0"/>
-              <a:t>of tasks </a:t>
-            </a:r>
-            <a:r>
-              <a:rPr lang="en-US" dirty="0" smtClean="0"/>
-              <a:t>to which code should apply</a:t>
-            </a:r>
-            <a:endParaRPr lang="en-US" dirty="0" smtClean="0"/>
-          </a:p>
-          <a:p>
-            <a:pPr>
-              <a:buFont typeface="Wingdings" panose="05000000000000000000" pitchFamily="2" charset="2"/>
-              <a:buChar char="q"/>
-            </a:pPr>
-            <a:r>
-              <a:rPr lang="en-US" dirty="0" smtClean="0"/>
-              <a:t>Acceptable programming languages</a:t>
-            </a:r>
+              <a:t>to create a </a:t>
+            </a:r>
+            <a:r>
+              <a:rPr lang="en-US" i="1" dirty="0"/>
+              <a:t>blueprint</a:t>
+            </a:r>
+            <a:r>
+              <a:rPr lang="en-US" dirty="0"/>
+              <a:t> for how the IM code repository will operate</a:t>
+            </a:r>
+          </a:p>
+          <a:p>
             <a:endParaRPr lang="en-US" dirty="0"/>
           </a:p>
         </p:txBody>
@@ -4191,7 +4523,7 @@
           <p:nvPr/>
         </p:nvPicPr>
         <p:blipFill>
-          <a:blip r:embed="rId2" cstate="print">
+          <a:blip r:embed="rId2">
             <a:extLst>
               <a:ext uri="{28A0092B-C50C-407E-A947-70E740481C1C}">
                 <a14:useLocalDpi xmlns:a14="http://schemas.microsoft.com/office/drawing/2010/main" val="0"/>
@@ -4204,198 +4536,18 @@
         </p:blipFill>
         <p:spPr>
           <a:xfrm>
-            <a:off x="6225037" y="1737360"/>
-            <a:ext cx="1300480" cy="1300480"/>
+            <a:off x="3313793" y="3124200"/>
+            <a:ext cx="3552372" cy="2664279"/>
           </a:xfrm>
           <a:prstGeom prst="rect">
             <a:avLst/>
           </a:prstGeom>
         </p:spPr>
       </p:pic>
-      <p:pic>
-        <p:nvPicPr>
-          <p:cNvPr id="7" name="Picture 6"/>
-          <p:cNvPicPr>
-            <a:picLocks noChangeAspect="1"/>
-          </p:cNvPicPr>
-          <p:nvPr/>
-        </p:nvPicPr>
-        <p:blipFill>
-          <a:blip r:embed="rId3" cstate="print">
-            <a:extLst>
-              <a:ext uri="{28A0092B-C50C-407E-A947-70E740481C1C}">
-                <a14:useLocalDpi xmlns:a14="http://schemas.microsoft.com/office/drawing/2010/main" val="0"/>
-              </a:ext>
-            </a:extLst>
-          </a:blip>
-          <a:stretch>
-            <a:fillRect/>
-          </a:stretch>
-        </p:blipFill>
-        <p:spPr>
-          <a:xfrm>
-            <a:off x="5508370" y="4368604"/>
-            <a:ext cx="1081537" cy="1068152"/>
-          </a:xfrm>
-          <a:prstGeom prst="rect">
-            <a:avLst/>
-          </a:prstGeom>
-        </p:spPr>
-      </p:pic>
-      <p:pic>
-        <p:nvPicPr>
-          <p:cNvPr id="9" name="Picture 8"/>
-          <p:cNvPicPr>
-            <a:picLocks noChangeAspect="1"/>
-          </p:cNvPicPr>
-          <p:nvPr/>
-        </p:nvPicPr>
-        <p:blipFill>
-          <a:blip r:embed="rId4">
-            <a:extLst>
-              <a:ext uri="{28A0092B-C50C-407E-A947-70E740481C1C}">
-                <a14:useLocalDpi xmlns:a14="http://schemas.microsoft.com/office/drawing/2010/main" val="0"/>
-              </a:ext>
-            </a:extLst>
-          </a:blip>
-          <a:stretch>
-            <a:fillRect/>
-          </a:stretch>
-        </p:blipFill>
-        <p:spPr>
-          <a:xfrm>
-            <a:off x="1202862" y="4868460"/>
-            <a:ext cx="1121341" cy="986948"/>
-          </a:xfrm>
-          <a:prstGeom prst="rect">
-            <a:avLst/>
-          </a:prstGeom>
-        </p:spPr>
-      </p:pic>
-      <p:pic>
-        <p:nvPicPr>
-          <p:cNvPr id="10" name="Picture 9"/>
-          <p:cNvPicPr>
-            <a:picLocks noChangeAspect="1"/>
-          </p:cNvPicPr>
-          <p:nvPr/>
-        </p:nvPicPr>
-        <p:blipFill>
-          <a:blip r:embed="rId5" cstate="print">
-            <a:extLst>
-              <a:ext uri="{28A0092B-C50C-407E-A947-70E740481C1C}">
-                <a14:useLocalDpi xmlns:a14="http://schemas.microsoft.com/office/drawing/2010/main" val="0"/>
-              </a:ext>
-            </a:extLst>
-          </a:blip>
-          <a:stretch>
-            <a:fillRect/>
-          </a:stretch>
-        </p:blipFill>
-        <p:spPr>
-          <a:xfrm>
-            <a:off x="1836485" y="4129506"/>
-            <a:ext cx="1445201" cy="1847962"/>
-          </a:xfrm>
-          <a:prstGeom prst="rect">
-            <a:avLst/>
-          </a:prstGeom>
-        </p:spPr>
-      </p:pic>
-      <p:pic>
-        <p:nvPicPr>
-          <p:cNvPr id="11" name="Picture 10"/>
-          <p:cNvPicPr>
-            <a:picLocks noChangeAspect="1"/>
-          </p:cNvPicPr>
-          <p:nvPr/>
-        </p:nvPicPr>
-        <p:blipFill>
-          <a:blip r:embed="rId6" cstate="print">
-            <a:extLst>
-              <a:ext uri="{28A0092B-C50C-407E-A947-70E740481C1C}">
-                <a14:useLocalDpi xmlns:a14="http://schemas.microsoft.com/office/drawing/2010/main" val="0"/>
-              </a:ext>
-            </a:extLst>
-          </a:blip>
-          <a:stretch>
-            <a:fillRect/>
-          </a:stretch>
-        </p:blipFill>
-        <p:spPr>
-          <a:xfrm>
-            <a:off x="2766214" y="4021132"/>
-            <a:ext cx="914402" cy="694945"/>
-          </a:xfrm>
-          <a:prstGeom prst="rect">
-            <a:avLst/>
-          </a:prstGeom>
-        </p:spPr>
-      </p:pic>
-      <p:pic>
-        <p:nvPicPr>
-          <p:cNvPr id="12" name="Picture 11"/>
-          <p:cNvPicPr>
-            <a:picLocks noChangeAspect="1"/>
-          </p:cNvPicPr>
-          <p:nvPr/>
-        </p:nvPicPr>
-        <p:blipFill>
-          <a:blip r:embed="rId7" cstate="print">
-            <a:extLst>
-              <a:ext uri="{28A0092B-C50C-407E-A947-70E740481C1C}">
-                <a14:useLocalDpi xmlns:a14="http://schemas.microsoft.com/office/drawing/2010/main" val="0"/>
-              </a:ext>
-            </a:extLst>
-          </a:blip>
-          <a:stretch>
-            <a:fillRect/>
-          </a:stretch>
-        </p:blipFill>
-        <p:spPr>
-          <a:xfrm>
-            <a:off x="6589907" y="3346902"/>
-            <a:ext cx="1871220" cy="1865462"/>
-          </a:xfrm>
-          <a:prstGeom prst="rect">
-            <a:avLst/>
-          </a:prstGeom>
-        </p:spPr>
-      </p:pic>
-      <p:sp>
-        <p:nvSpPr>
-          <p:cNvPr id="13" name="TextBox 12"/>
-          <p:cNvSpPr txBox="1"/>
-          <p:nvPr/>
-        </p:nvSpPr>
-        <p:spPr>
-          <a:xfrm>
-            <a:off x="7479271" y="5166524"/>
-            <a:ext cx="2329132" cy="200055"/>
-          </a:xfrm>
-          <a:prstGeom prst="rect">
-            <a:avLst/>
-          </a:prstGeom>
-          <a:noFill/>
-        </p:spPr>
-        <p:txBody>
-          <a:bodyPr wrap="square" rtlCol="0">
-            <a:spAutoFit/>
-          </a:bodyPr>
-          <a:lstStyle/>
-          <a:p>
-            <a:r>
-              <a:rPr lang="en-US" sz="700" dirty="0" smtClean="0"/>
-              <a:t>http://kepler-project.org</a:t>
-            </a:r>
-            <a:endParaRPr lang="en-US" sz="700" dirty="0"/>
-          </a:p>
-        </p:txBody>
-      </p:sp>
     </p:spTree>
     <p:extLst>
       <p:ext uri="{BB962C8B-B14F-4D97-AF65-F5344CB8AC3E}">
-        <p14:creationId xmlns:p14="http://schemas.microsoft.com/office/powerpoint/2010/main" val="3779115533"/>
+        <p14:creationId xmlns:p14="http://schemas.microsoft.com/office/powerpoint/2010/main" val="2597044671"/>
       </p:ext>
     </p:extLst>
   </p:cSld>
@@ -4439,7 +4591,11 @@
           <a:p>
             <a:r>
               <a:rPr lang="en-US" dirty="0" smtClean="0"/>
-              <a:t>Considerations:</a:t>
+              <a:t>Considerations</a:t>
+            </a:r>
+            <a:r>
+              <a:rPr lang="en-US" dirty="0" smtClean="0"/>
+              <a:t>:</a:t>
             </a:r>
             <a:endParaRPr lang="en-US" dirty="0"/>
           </a:p>
@@ -4466,7 +4622,28 @@
             </a:pPr>
             <a:r>
               <a:rPr lang="en-US" dirty="0" smtClean="0"/>
-              <a:t>Repository structure</a:t>
+              <a:t>Repository</a:t>
+            </a:r>
+          </a:p>
+          <a:p>
+            <a:pPr lvl="1">
+              <a:buFont typeface="Wingdings" panose="05000000000000000000" pitchFamily="2" charset="2"/>
+              <a:buChar char="q"/>
+            </a:pPr>
+            <a:r>
+              <a:rPr lang="en-US" dirty="0" smtClean="0"/>
+              <a:t>Structure</a:t>
+            </a:r>
+            <a:endParaRPr lang="en-US" dirty="0"/>
+          </a:p>
+          <a:p>
+            <a:pPr lvl="1">
+              <a:buFont typeface="Wingdings" panose="05000000000000000000" pitchFamily="2" charset="2"/>
+              <a:buChar char="q"/>
+            </a:pPr>
+            <a:r>
+              <a:rPr lang="en-US" dirty="0" smtClean="0"/>
+              <a:t>Governance</a:t>
             </a:r>
           </a:p>
           <a:p>
@@ -4475,29 +4652,43 @@
               <a:buChar char="q"/>
             </a:pPr>
             <a:r>
+              <a:rPr lang="en-US" dirty="0" smtClean="0"/>
+              <a:t>Code</a:t>
+            </a:r>
+            <a:endParaRPr lang="en-US" dirty="0"/>
+          </a:p>
+          <a:p>
+            <a:pPr lvl="1">
+              <a:buFont typeface="Wingdings" panose="05000000000000000000" pitchFamily="2" charset="2"/>
+              <a:buChar char="q"/>
+            </a:pPr>
+            <a:r>
+              <a:rPr lang="en-US" dirty="0" smtClean="0"/>
+              <a:t>Reusability</a:t>
+            </a:r>
+          </a:p>
+          <a:p>
+            <a:pPr lvl="1">
+              <a:buFont typeface="Wingdings" panose="05000000000000000000" pitchFamily="2" charset="2"/>
+              <a:buChar char="q"/>
+            </a:pPr>
+            <a:r>
               <a:rPr lang="en-US" dirty="0"/>
-              <a:t>Governance</a:t>
-            </a:r>
+              <a:t>Discoverability</a:t>
+            </a:r>
+          </a:p>
+          <a:p>
+            <a:pPr marL="201168" lvl="1" indent="0">
+              <a:buNone/>
+            </a:pPr>
+            <a:endParaRPr lang="en-US" dirty="0" smtClean="0"/>
           </a:p>
           <a:p>
             <a:pPr>
               <a:buFont typeface="Wingdings" panose="05000000000000000000" pitchFamily="2" charset="2"/>
               <a:buChar char="q"/>
             </a:pPr>
-            <a:r>
-              <a:rPr lang="en-US" dirty="0" smtClean="0"/>
-              <a:t>Discoverability</a:t>
-            </a:r>
-          </a:p>
-          <a:p>
-            <a:pPr>
-              <a:buFont typeface="Wingdings" panose="05000000000000000000" pitchFamily="2" charset="2"/>
-              <a:buChar char="q"/>
-            </a:pPr>
-            <a:r>
-              <a:rPr lang="en-US" dirty="0" smtClean="0"/>
-              <a:t>Re-use</a:t>
-            </a:r>
+            <a:endParaRPr lang="en-US" dirty="0" smtClean="0"/>
           </a:p>
         </p:txBody>
       </p:sp>
@@ -4523,7 +4714,7 @@
         </p:blipFill>
         <p:spPr>
           <a:xfrm>
-            <a:off x="10427856" y="1975449"/>
+            <a:off x="4794499" y="4032849"/>
             <a:ext cx="1232092" cy="1621766"/>
           </a:xfrm>
           <a:prstGeom prst="rect">
@@ -4578,7 +4769,7 @@
           <a:p>
             <a:r>
               <a:rPr lang="en-US" dirty="0" smtClean="0"/>
-              <a:t>How should we structure the IM Code Repository?</a:t>
+              <a:t>How should the IM Code Repository be structured?</a:t>
             </a:r>
             <a:endParaRPr lang="en-US" dirty="0"/>
           </a:p>
@@ -4605,11 +4796,7 @@
             </a:pPr>
             <a:r>
               <a:rPr lang="en-US" dirty="0" smtClean="0"/>
-              <a:t>Decentralized approach – the repository is essentially a catalog, pointing to whatever repository the code developer </a:t>
-            </a:r>
-            <a:r>
-              <a:rPr lang="en-US" dirty="0" smtClean="0"/>
-              <a:t>prefers</a:t>
+              <a:t>Decentralized approach – the repository is essentially a catalog, pointing to whatever repository the code developer prefers</a:t>
             </a:r>
           </a:p>
           <a:p>
@@ -4619,15 +4806,7 @@
             </a:pPr>
             <a:r>
               <a:rPr lang="en-US" dirty="0" smtClean="0"/>
-              <a:t>Centralized </a:t>
-            </a:r>
-            <a:r>
-              <a:rPr lang="en-US" dirty="0" smtClean="0"/>
-              <a:t>approach – all code </a:t>
-            </a:r>
-            <a:r>
-              <a:rPr lang="en-US" dirty="0" smtClean="0"/>
-              <a:t>is in </a:t>
+              <a:t>Centralized approach – all code is in </a:t>
             </a:r>
             <a:r>
               <a:rPr lang="en-US" dirty="0" err="1" smtClean="0"/>
@@ -4642,73 +4821,12 @@
             </a:pPr>
             <a:r>
               <a:rPr lang="en-US" dirty="0" smtClean="0"/>
-              <a:t>Hybrid approach </a:t>
-            </a:r>
-            <a:r>
-              <a:rPr lang="en-US" dirty="0" smtClean="0"/>
-              <a:t>– a catalog plus the centralized repository</a:t>
-            </a:r>
-          </a:p>
-          <a:p>
-            <a:pPr>
-              <a:buFont typeface="Wingdings" panose="05000000000000000000" pitchFamily="2" charset="2"/>
-              <a:buChar char="q"/>
-            </a:pPr>
-            <a:r>
-              <a:rPr lang="en-US" dirty="0"/>
-              <a:t>Issues:  </a:t>
-            </a:r>
-            <a:endParaRPr lang="en-US" dirty="0" smtClean="0"/>
-          </a:p>
-          <a:p>
-            <a:pPr lvl="1">
-              <a:buFont typeface="Wingdings" panose="05000000000000000000" pitchFamily="2" charset="2"/>
-              <a:buChar char="q"/>
-            </a:pPr>
-            <a:r>
-              <a:rPr lang="en-US" dirty="0" smtClean="0"/>
-              <a:t>Searching within and across code repositories</a:t>
-            </a:r>
-          </a:p>
-          <a:p>
-            <a:pPr lvl="1">
-              <a:buFont typeface="Wingdings" panose="05000000000000000000" pitchFamily="2" charset="2"/>
-              <a:buChar char="q"/>
-            </a:pPr>
-            <a:r>
-              <a:rPr lang="en-US" dirty="0" smtClean="0"/>
-              <a:t>Repository persistence</a:t>
-            </a:r>
-          </a:p>
-          <a:p>
-            <a:pPr lvl="1">
-              <a:buFont typeface="Wingdings" panose="05000000000000000000" pitchFamily="2" charset="2"/>
-              <a:buChar char="q"/>
-            </a:pPr>
-            <a:r>
-              <a:rPr lang="en-US" dirty="0" smtClean="0"/>
-              <a:t>DOI assignment</a:t>
-            </a:r>
-          </a:p>
-          <a:p>
-            <a:pPr lvl="1">
-              <a:buFont typeface="Wingdings" panose="05000000000000000000" pitchFamily="2" charset="2"/>
-              <a:buChar char="q"/>
-            </a:pPr>
-            <a:r>
-              <a:rPr lang="en-US" dirty="0"/>
-              <a:t>G</a:t>
-            </a:r>
-            <a:r>
-              <a:rPr lang="en-US" dirty="0" smtClean="0"/>
-              <a:t>overnance</a:t>
-            </a:r>
-            <a:endParaRPr lang="en-US" dirty="0"/>
-          </a:p>
-          <a:p>
-            <a:pPr>
-              <a:buFont typeface="Wingdings" panose="05000000000000000000" pitchFamily="2" charset="2"/>
-              <a:buChar char="q"/>
+              <a:t>Hybrid approach – a catalog plus the centralized repository</a:t>
+            </a:r>
+          </a:p>
+          <a:p>
+            <a:pPr marL="0" indent="0">
+              <a:buNone/>
             </a:pPr>
             <a:endParaRPr lang="en-US" dirty="0" smtClean="0"/>
           </a:p>
@@ -4761,19 +4879,7 @@
           <a:p>
             <a:r>
               <a:rPr lang="en-US" dirty="0" smtClean="0"/>
-              <a:t>How should the code </a:t>
-            </a:r>
-            <a:r>
-              <a:rPr lang="en-US" dirty="0" smtClean="0"/>
-              <a:t>repository</a:t>
-            </a:r>
-            <a:r>
-              <a:rPr lang="en-US" dirty="0" smtClean="0"/>
-              <a:t> </a:t>
-            </a:r>
-            <a:r>
-              <a:rPr lang="en-US" dirty="0" smtClean="0"/>
-              <a:t>be governed?</a:t>
+              <a:t>How should the code repository be governed?</a:t>
             </a:r>
             <a:endParaRPr lang="en-US" dirty="0"/>
           </a:p>
@@ -4832,7 +4938,7 @@
             </a:pPr>
             <a:r>
               <a:rPr lang="en-US" sz="2000" dirty="0" smtClean="0"/>
-              <a:t>Responsible for ensuring that code passes quality tests and evaluating metadata for quality and completeness. </a:t>
+              <a:t>Responsible for ensuring that code passes quality tests and for evaluating metadata for quality and completeness. </a:t>
             </a:r>
           </a:p>
           <a:p>
@@ -5152,6 +5258,95 @@
 </file>
 
 <file path=ppt/slides/slide8.xml><?xml version="1.0" encoding="utf-8"?>
+<p:sld xmlns:a="http://schemas.openxmlformats.org/drawingml/2006/main" xmlns:r="http://schemas.openxmlformats.org/officeDocument/2006/relationships" xmlns:p="http://schemas.openxmlformats.org/presentationml/2006/main">
+  <p:cSld>
+    <p:spTree>
+      <p:nvGrpSpPr>
+        <p:cNvPr id="1" name=""/>
+        <p:cNvGrpSpPr/>
+        <p:nvPr/>
+      </p:nvGrpSpPr>
+      <p:grpSpPr>
+        <a:xfrm>
+          <a:off x="0" y="0"/>
+          <a:ext cx="0" cy="0"/>
+          <a:chOff x="0" y="0"/>
+          <a:chExt cx="0" cy="0"/>
+        </a:xfrm>
+      </p:grpSpPr>
+      <p:sp>
+        <p:nvSpPr>
+          <p:cNvPr id="2" name="Title 1"/>
+          <p:cNvSpPr>
+            <a:spLocks noGrp="1"/>
+          </p:cNvSpPr>
+          <p:nvPr>
+            <p:ph type="title"/>
+          </p:nvPr>
+        </p:nvSpPr>
+        <p:spPr/>
+        <p:txBody>
+          <a:bodyPr/>
+          <a:lstStyle/>
+          <a:p>
+            <a:r>
+              <a:rPr lang="en-US" dirty="0" smtClean="0"/>
+              <a:t>Code Discoverability</a:t>
+            </a:r>
+            <a:endParaRPr lang="en-US" dirty="0"/>
+          </a:p>
+        </p:txBody>
+      </p:sp>
+      <p:sp>
+        <p:nvSpPr>
+          <p:cNvPr id="3" name="Content Placeholder 2"/>
+          <p:cNvSpPr>
+            <a:spLocks noGrp="1"/>
+          </p:cNvSpPr>
+          <p:nvPr>
+            <p:ph idx="1"/>
+          </p:nvPr>
+        </p:nvSpPr>
+        <p:spPr/>
+        <p:txBody>
+          <a:bodyPr/>
+          <a:lstStyle/>
+          <a:p>
+            <a:pPr>
+              <a:buFont typeface="Wingdings" panose="05000000000000000000" pitchFamily="2" charset="2"/>
+              <a:buChar char="q"/>
+            </a:pPr>
+            <a:r>
+              <a:rPr lang="en-US" dirty="0" smtClean="0"/>
+              <a:t>Controlled vocabulary</a:t>
+            </a:r>
+          </a:p>
+          <a:p>
+            <a:pPr>
+              <a:buFont typeface="Wingdings" panose="05000000000000000000" pitchFamily="2" charset="2"/>
+              <a:buChar char="q"/>
+            </a:pPr>
+            <a:r>
+              <a:rPr lang="en-US" dirty="0" smtClean="0"/>
+              <a:t>Application to query metadata</a:t>
+            </a:r>
+          </a:p>
+        </p:txBody>
+      </p:sp>
+    </p:spTree>
+    <p:extLst>
+      <p:ext uri="{BB962C8B-B14F-4D97-AF65-F5344CB8AC3E}">
+        <p14:creationId xmlns:p14="http://schemas.microsoft.com/office/powerpoint/2010/main" val="4177943785"/>
+      </p:ext>
+    </p:extLst>
+  </p:cSld>
+  <p:clrMapOvr>
+    <a:masterClrMapping/>
+  </p:clrMapOvr>
+</p:sld>
+</file>
+
+<file path=ppt/slides/slide9.xml><?xml version="1.0" encoding="utf-8"?>
 <p:sld xmlns:a="http://schemas.openxmlformats.org/drawingml/2006/main" xmlns:r="http://schemas.openxmlformats.org/officeDocument/2006/relationships" xmlns:p="http://schemas.openxmlformats.org/presentationml/2006/main">
   <p:cSld>
     <p:spTree>
@@ -5324,116 +5519,6 @@
     <p:extLst>
       <p:ext uri="{BB962C8B-B14F-4D97-AF65-F5344CB8AC3E}">
         <p14:creationId xmlns:p14="http://schemas.microsoft.com/office/powerpoint/2010/main" val="2378656470"/>
-      </p:ext>
-    </p:extLst>
-  </p:cSld>
-  <p:clrMapOvr>
-    <a:masterClrMapping/>
-  </p:clrMapOvr>
-</p:sld>
-</file>
-
-<file path=ppt/slides/slide9.xml><?xml version="1.0" encoding="utf-8"?>
-<p:sld xmlns:a="http://schemas.openxmlformats.org/drawingml/2006/main" xmlns:r="http://schemas.openxmlformats.org/officeDocument/2006/relationships" xmlns:p="http://schemas.openxmlformats.org/presentationml/2006/main">
-  <p:cSld>
-    <p:spTree>
-      <p:nvGrpSpPr>
-        <p:cNvPr id="1" name=""/>
-        <p:cNvGrpSpPr/>
-        <p:nvPr/>
-      </p:nvGrpSpPr>
-      <p:grpSpPr>
-        <a:xfrm>
-          <a:off x="0" y="0"/>
-          <a:ext cx="0" cy="0"/>
-          <a:chOff x="0" y="0"/>
-          <a:chExt cx="0" cy="0"/>
-        </a:xfrm>
-      </p:grpSpPr>
-      <p:sp>
-        <p:nvSpPr>
-          <p:cNvPr id="2" name="Title 1"/>
-          <p:cNvSpPr>
-            <a:spLocks noGrp="1"/>
-          </p:cNvSpPr>
-          <p:nvPr>
-            <p:ph type="title"/>
-          </p:nvPr>
-        </p:nvSpPr>
-        <p:spPr/>
-        <p:txBody>
-          <a:bodyPr/>
-          <a:lstStyle/>
-          <a:p>
-            <a:r>
-              <a:rPr lang="en-US" dirty="0" smtClean="0"/>
-              <a:t>Join us to finish the IM Repository blueprint!</a:t>
-            </a:r>
-            <a:endParaRPr lang="en-US" dirty="0"/>
-          </a:p>
-        </p:txBody>
-      </p:sp>
-      <p:sp>
-        <p:nvSpPr>
-          <p:cNvPr id="3" name="Content Placeholder 2"/>
-          <p:cNvSpPr>
-            <a:spLocks noGrp="1"/>
-          </p:cNvSpPr>
-          <p:nvPr>
-            <p:ph idx="1"/>
-          </p:nvPr>
-        </p:nvSpPr>
-        <p:spPr/>
-        <p:txBody>
-          <a:bodyPr/>
-          <a:lstStyle/>
-          <a:p>
-            <a:pPr>
-              <a:buFont typeface="Wingdings" panose="05000000000000000000" pitchFamily="2" charset="2"/>
-              <a:buChar char="q"/>
-            </a:pPr>
-            <a:r>
-              <a:rPr lang="en-US" dirty="0" smtClean="0"/>
-              <a:t>Volunteers sought to co-author and review the ‘blueprint’ once we have assembled it.</a:t>
-            </a:r>
-            <a:endParaRPr lang="en-US" dirty="0"/>
-          </a:p>
-        </p:txBody>
-      </p:sp>
-      <p:pic>
-        <p:nvPicPr>
-          <p:cNvPr id="4" name="Picture 3"/>
-          <p:cNvPicPr>
-            <a:picLocks noChangeAspect="1"/>
-          </p:cNvPicPr>
-          <p:nvPr/>
-        </p:nvPicPr>
-        <p:blipFill>
-          <a:blip r:embed="rId2">
-            <a:extLst>
-              <a:ext uri="{28A0092B-C50C-407E-A947-70E740481C1C}">
-                <a14:useLocalDpi xmlns:a14="http://schemas.microsoft.com/office/drawing/2010/main" val="0"/>
-              </a:ext>
-            </a:extLst>
-          </a:blip>
-          <a:stretch>
-            <a:fillRect/>
-          </a:stretch>
-        </p:blipFill>
-        <p:spPr>
-          <a:xfrm>
-            <a:off x="698739" y="2912781"/>
-            <a:ext cx="2212748" cy="2212748"/>
-          </a:xfrm>
-          <a:prstGeom prst="rect">
-            <a:avLst/>
-          </a:prstGeom>
-        </p:spPr>
-      </p:pic>
-    </p:spTree>
-    <p:extLst>
-      <p:ext uri="{BB962C8B-B14F-4D97-AF65-F5344CB8AC3E}">
-        <p14:creationId xmlns:p14="http://schemas.microsoft.com/office/powerpoint/2010/main" val="2469712582"/>
       </p:ext>
     </p:extLst>
   </p:cSld>

</xml_diff>

<commit_message>
Modified powerpoint after talking to Colin#
</commit_message>
<xml_diff>
--- a/Building an Information Management Code Library.pptx
+++ b/Building an Information Management Code Library.pptx
@@ -4034,7 +4034,19 @@
             </a:pPr>
             <a:r>
               <a:rPr lang="en-US" dirty="0" smtClean="0"/>
-              <a:t>Volunteers sought to co-author and review the ‘blueprint</a:t>
+              <a:t>Volunteers sought to co-author </a:t>
+            </a:r>
+            <a:r>
+              <a:rPr lang="en-US" dirty="0" smtClean="0"/>
+              <a:t>or</a:t>
+            </a:r>
+            <a:r>
+              <a:rPr lang="en-US" dirty="0" smtClean="0"/>
+              <a:t> </a:t>
+            </a:r>
+            <a:r>
+              <a:rPr lang="en-US" dirty="0" smtClean="0"/>
+              <a:t>review the ‘blueprint</a:t>
             </a:r>
             <a:r>
               <a:rPr lang="en-US" dirty="0" smtClean="0"/>
@@ -4066,7 +4078,7 @@
         </p:blipFill>
         <p:spPr>
           <a:xfrm>
-            <a:off x="698739" y="2912781"/>
+            <a:off x="2487079" y="3543960"/>
             <a:ext cx="2212748" cy="2212748"/>
           </a:xfrm>
           <a:prstGeom prst="rect">
@@ -4796,7 +4808,11 @@
             </a:pPr>
             <a:r>
               <a:rPr lang="en-US" dirty="0" smtClean="0"/>
-              <a:t>Decentralized approach – the repository is essentially a catalog, pointing to whatever repository the code developer prefers</a:t>
+              <a:t>Decentralized </a:t>
+            </a:r>
+            <a:r>
+              <a:rPr lang="en-US" dirty="0" smtClean="0"/>
+              <a:t>approach – the repository is essentially a catalog, pointing to whatever repository the code developer prefers</a:t>
             </a:r>
           </a:p>
           <a:p>
@@ -4821,7 +4837,15 @@
             </a:pPr>
             <a:r>
               <a:rPr lang="en-US" dirty="0" smtClean="0"/>
-              <a:t>Hybrid approach – a catalog plus the centralized repository</a:t>
+              <a:t>Hybrid approach – a catalog plus the centralized </a:t>
+            </a:r>
+            <a:r>
+              <a:rPr lang="en-US" dirty="0" err="1" smtClean="0"/>
+              <a:t>github</a:t>
+            </a:r>
+            <a:r>
+              <a:rPr lang="en-US" dirty="0" smtClean="0"/>
+              <a:t> repository</a:t>
             </a:r>
           </a:p>
           <a:p>
@@ -4830,8 +4854,44 @@
             </a:pPr>
             <a:endParaRPr lang="en-US" dirty="0" smtClean="0"/>
           </a:p>
-        </p:txBody>
-      </p:sp>
+          <a:p>
+            <a:pPr marL="0" indent="0">
+              <a:buNone/>
+            </a:pPr>
+            <a:endParaRPr lang="en-US" dirty="0" smtClean="0"/>
+          </a:p>
+        </p:txBody>
+      </p:sp>
+      <p:pic>
+        <p:nvPicPr>
+          <p:cNvPr id="7" name="Picture 6"/>
+          <p:cNvPicPr>
+            <a:picLocks noChangeAspect="1"/>
+          </p:cNvPicPr>
+          <p:nvPr/>
+        </p:nvPicPr>
+        <p:blipFill>
+          <a:blip r:embed="rId2" cstate="print">
+            <a:extLst>
+              <a:ext uri="{28A0092B-C50C-407E-A947-70E740481C1C}">
+                <a14:useLocalDpi xmlns:a14="http://schemas.microsoft.com/office/drawing/2010/main" val="0"/>
+              </a:ext>
+            </a:extLst>
+          </a:blip>
+          <a:stretch>
+            <a:fillRect/>
+          </a:stretch>
+        </p:blipFill>
+        <p:spPr>
+          <a:xfrm>
+            <a:off x="8184748" y="3857414"/>
+            <a:ext cx="2347181" cy="2151683"/>
+          </a:xfrm>
+          <a:prstGeom prst="rect">
+            <a:avLst/>
+          </a:prstGeom>
+        </p:spPr>
+      </p:pic>
     </p:spTree>
     <p:extLst>
       <p:ext uri="{BB962C8B-B14F-4D97-AF65-F5344CB8AC3E}">
@@ -4979,8 +5039,13 @@
             </a:pPr>
             <a:r>
               <a:rPr lang="en-US" sz="2000" dirty="0" smtClean="0"/>
-              <a:t>Term of service and rotation</a:t>
-            </a:r>
+              <a:t>Term of </a:t>
+            </a:r>
+            <a:r>
+              <a:rPr lang="en-US" sz="2000" dirty="0" smtClean="0"/>
+              <a:t>service</a:t>
+            </a:r>
+            <a:endParaRPr lang="en-US" sz="2000" dirty="0" smtClean="0"/>
           </a:p>
           <a:p>
             <a:pPr lvl="3" fontAlgn="base">
@@ -5077,7 +5142,11 @@
             </a:r>
             <a:r>
               <a:rPr lang="en-US" dirty="0" smtClean="0"/>
-              <a:t>that a script should meet?  </a:t>
+              <a:t>for a script to be considered reusable</a:t>
+            </a:r>
+            <a:r>
+              <a:rPr lang="en-US" dirty="0" smtClean="0"/>
+              <a:t>?  </a:t>
             </a:r>
             <a:endParaRPr lang="en-US" dirty="0"/>
           </a:p>
@@ -5095,7 +5164,9 @@
         </p:nvSpPr>
         <p:spPr/>
         <p:txBody>
-          <a:bodyPr/>
+          <a:bodyPr>
+            <a:normAutofit/>
+          </a:bodyPr>
           <a:lstStyle/>
           <a:p>
             <a:pPr>
@@ -5114,7 +5185,11 @@
             </a:pPr>
             <a:r>
               <a:rPr lang="en-US" dirty="0" smtClean="0"/>
-              <a:t>Well documented at the code package level and within the source code</a:t>
+              <a:t>Well documented at the code package </a:t>
+            </a:r>
+            <a:r>
+              <a:rPr lang="en-US" dirty="0" smtClean="0"/>
+              <a:t>level</a:t>
             </a:r>
           </a:p>
           <a:p>
@@ -5128,7 +5203,15 @@
             </a:r>
             <a:r>
               <a:rPr lang="en-US" dirty="0" smtClean="0"/>
-              <a:t> minimal metadata schema for science software and code</a:t>
+              <a:t> </a:t>
+            </a:r>
+            <a:r>
+              <a:rPr lang="en-US" dirty="0" smtClean="0"/>
+              <a:t>minimal metadata schema for science software and </a:t>
+            </a:r>
+            <a:r>
+              <a:rPr lang="en-US" dirty="0" smtClean="0"/>
+              <a:t>code</a:t>
             </a:r>
           </a:p>
           <a:p>
@@ -5138,7 +5221,25 @@
             </a:pPr>
             <a:r>
               <a:rPr lang="en-US" dirty="0" smtClean="0"/>
-              <a:t>Documentation of how code is installed and used</a:t>
+              <a:t>Documentation </a:t>
+            </a:r>
+            <a:r>
+              <a:rPr lang="en-US" dirty="0" smtClean="0"/>
+              <a:t>of how code is installed and </a:t>
+            </a:r>
+            <a:r>
+              <a:rPr lang="en-US" dirty="0" smtClean="0"/>
+              <a:t>used</a:t>
+            </a:r>
+          </a:p>
+          <a:p>
+            <a:pPr>
+              <a:buFont typeface="Wingdings" panose="05000000000000000000" pitchFamily="2" charset="2"/>
+              <a:buChar char="q"/>
+            </a:pPr>
+            <a:r>
+              <a:rPr lang="en-US" dirty="0" smtClean="0"/>
+              <a:t>Well documented within the script</a:t>
             </a:r>
           </a:p>
           <a:p>
@@ -5148,7 +5249,25 @@
             </a:pPr>
             <a:r>
               <a:rPr lang="en-US" dirty="0" smtClean="0"/>
-              <a:t>Controlled vocabulary terms</a:t>
+              <a:t>Code </a:t>
+            </a:r>
+            <a:r>
+              <a:rPr lang="en-US" dirty="0" smtClean="0"/>
+              <a:t>is thoroughly commented and adheres to a language-specific style guide</a:t>
+            </a:r>
+          </a:p>
+          <a:p>
+            <a:pPr>
+              <a:buFont typeface="Wingdings" panose="05000000000000000000" pitchFamily="2" charset="2"/>
+              <a:buChar char="q"/>
+            </a:pPr>
+            <a:r>
+              <a:rPr lang="en-US" dirty="0" smtClean="0"/>
+              <a:t>Passes tests </a:t>
+            </a:r>
+            <a:r>
+              <a:rPr lang="en-US" dirty="0" smtClean="0"/>
+              <a:t>of the code itself</a:t>
             </a:r>
           </a:p>
           <a:p>
@@ -5158,17 +5277,33 @@
             </a:pPr>
             <a:r>
               <a:rPr lang="en-US" dirty="0" smtClean="0"/>
-              <a:t>Code is thoroughly commented and adheres to a language-specific style guide</a:t>
-            </a:r>
-          </a:p>
-          <a:p>
-            <a:pPr>
+              <a:t>Example </a:t>
+            </a:r>
+            <a:r>
+              <a:rPr lang="en-US" dirty="0" smtClean="0"/>
+              <a:t>inputs</a:t>
+            </a:r>
+            <a:r>
+              <a:rPr lang="en-US" dirty="0" smtClean="0"/>
+              <a:t> </a:t>
+            </a:r>
+            <a:r>
+              <a:rPr lang="en-US" dirty="0"/>
+              <a:t>and expected output (use cases</a:t>
+            </a:r>
+            <a:r>
+              <a:rPr lang="en-US" dirty="0" smtClean="0"/>
+              <a:t>) </a:t>
+            </a:r>
+          </a:p>
+          <a:p>
+            <a:pPr lvl="2">
               <a:buFont typeface="Wingdings" panose="05000000000000000000" pitchFamily="2" charset="2"/>
               <a:buChar char="q"/>
             </a:pPr>
             <a:r>
               <a:rPr lang="en-US" dirty="0" smtClean="0"/>
-              <a:t>Pass conceptual tests and tests of the code itself</a:t>
+              <a:t>Code does what it says it says it will do</a:t>
             </a:r>
           </a:p>
           <a:p>
@@ -5178,31 +5313,24 @@
             </a:pPr>
             <a:r>
               <a:rPr lang="en-US" dirty="0" smtClean="0"/>
-              <a:t>Example data sets </a:t>
-            </a:r>
-            <a:r>
-              <a:rPr lang="en-US" dirty="0"/>
-              <a:t>and expected output (use cases</a:t>
-            </a:r>
-            <a:r>
-              <a:rPr lang="en-US" dirty="0" smtClean="0"/>
-              <a:t>)</a:t>
-            </a:r>
-          </a:p>
-          <a:p>
-            <a:pPr lvl="1">
-              <a:buFont typeface="Wingdings" panose="05000000000000000000" pitchFamily="2" charset="2"/>
-              <a:buChar char="q"/>
+              <a:t>Robust to variations in inputs</a:t>
+            </a:r>
+          </a:p>
+          <a:p>
+            <a:pPr marL="0" indent="0">
+              <a:buNone/>
             </a:pPr>
-            <a:r>
-              <a:rPr lang="en-US" dirty="0" smtClean="0"/>
-              <a:t>Provides meaningful error messages</a:t>
-            </a:r>
-          </a:p>
-          <a:p>
-            <a:pPr>
-              <a:buFont typeface="Wingdings" panose="05000000000000000000" pitchFamily="2" charset="2"/>
-              <a:buChar char="q"/>
+            <a:endParaRPr lang="en-US" dirty="0" smtClean="0"/>
+          </a:p>
+          <a:p>
+            <a:pPr marL="201168" lvl="1" indent="0">
+              <a:buNone/>
+            </a:pPr>
+            <a:endParaRPr lang="en-US" dirty="0" smtClean="0"/>
+          </a:p>
+          <a:p>
+            <a:pPr marL="0" indent="0">
+              <a:buNone/>
             </a:pPr>
             <a:endParaRPr lang="en-US" dirty="0" smtClean="0"/>
           </a:p>
@@ -5291,7 +5419,7 @@
           <a:p>
             <a:r>
               <a:rPr lang="en-US" dirty="0" smtClean="0"/>
-              <a:t>Code Discoverability</a:t>
+              <a:t>What mechanisms will be employed to ensure that code is discoverable?</a:t>
             </a:r>
             <a:endParaRPr lang="en-US" dirty="0"/>
           </a:p>
@@ -5318,7 +5446,15 @@
             </a:pPr>
             <a:r>
               <a:rPr lang="en-US" dirty="0" smtClean="0"/>
-              <a:t>Controlled vocabulary</a:t>
+              <a:t>Develop a controlled vocabulary for </a:t>
+            </a:r>
+            <a:r>
+              <a:rPr lang="en-US" dirty="0" err="1" smtClean="0"/>
+              <a:t>CodeMeta</a:t>
+            </a:r>
+            <a:r>
+              <a:rPr lang="en-US" dirty="0" smtClean="0"/>
+              <a:t> (keywords element) and repository tags</a:t>
             </a:r>
           </a:p>
           <a:p>
@@ -5328,11 +5464,68 @@
             </a:pPr>
             <a:r>
               <a:rPr lang="en-US" dirty="0" smtClean="0"/>
-              <a:t>Application to query metadata</a:t>
-            </a:r>
-          </a:p>
-        </p:txBody>
-      </p:sp>
+              <a:t>Develop an application to query the software metadata</a:t>
+            </a:r>
+            <a:endParaRPr lang="en-US" dirty="0"/>
+          </a:p>
+          <a:p>
+            <a:pPr lvl="1">
+              <a:buFont typeface="Wingdings" panose="05000000000000000000" pitchFamily="2" charset="2"/>
+              <a:buChar char="q"/>
+            </a:pPr>
+            <a:r>
+              <a:rPr lang="en-US" dirty="0" smtClean="0"/>
+              <a:t>Author</a:t>
+            </a:r>
+          </a:p>
+          <a:p>
+            <a:pPr lvl="1">
+              <a:buFont typeface="Wingdings" panose="05000000000000000000" pitchFamily="2" charset="2"/>
+              <a:buChar char="q"/>
+            </a:pPr>
+            <a:r>
+              <a:rPr lang="en-US" dirty="0" smtClean="0"/>
+              <a:t>Operating system specifics</a:t>
+            </a:r>
+          </a:p>
+          <a:p>
+            <a:pPr marL="201168" lvl="1" indent="0">
+              <a:buNone/>
+            </a:pPr>
+            <a:endParaRPr lang="en-US" dirty="0" smtClean="0"/>
+          </a:p>
+        </p:txBody>
+      </p:sp>
+      <p:pic>
+        <p:nvPicPr>
+          <p:cNvPr id="4" name="Picture 3"/>
+          <p:cNvPicPr>
+            <a:picLocks noChangeAspect="1"/>
+          </p:cNvPicPr>
+          <p:nvPr/>
+        </p:nvPicPr>
+        <p:blipFill>
+          <a:blip r:embed="rId2" cstate="print">
+            <a:extLst>
+              <a:ext uri="{28A0092B-C50C-407E-A947-70E740481C1C}">
+                <a14:useLocalDpi xmlns:a14="http://schemas.microsoft.com/office/drawing/2010/main" val="0"/>
+              </a:ext>
+            </a:extLst>
+          </a:blip>
+          <a:stretch>
+            <a:fillRect/>
+          </a:stretch>
+        </p:blipFill>
+        <p:spPr>
+          <a:xfrm>
+            <a:off x="8154762" y="3179989"/>
+            <a:ext cx="2140404" cy="2031438"/>
+          </a:xfrm>
+          <a:prstGeom prst="rect">
+            <a:avLst/>
+          </a:prstGeom>
+        </p:spPr>
+      </p:pic>
     </p:spTree>
     <p:extLst>
       <p:ext uri="{BB962C8B-B14F-4D97-AF65-F5344CB8AC3E}">
@@ -5427,8 +5620,9 @@
             </a:pPr>
             <a:r>
               <a:rPr lang="en-US" dirty="0" smtClean="0"/>
-              <a:t>User Support</a:t>
-            </a:r>
+              <a:t>User support by code creator?</a:t>
+            </a:r>
+            <a:endParaRPr lang="en-US" dirty="0" smtClean="0"/>
           </a:p>
           <a:p>
             <a:pPr>
@@ -5441,15 +5635,19 @@
             </a:r>
           </a:p>
           <a:p>
-            <a:pPr marL="0" indent="0">
-              <a:buNone/>
-            </a:pPr>
-            <a:endParaRPr lang="en-US" dirty="0" smtClean="0"/>
-          </a:p>
-          <a:p>
             <a:pPr>
               <a:buFont typeface="Wingdings" panose="05000000000000000000" pitchFamily="2" charset="2"/>
               <a:buChar char="q"/>
+            </a:pPr>
+            <a:r>
+              <a:rPr lang="en-US" dirty="0" smtClean="0"/>
+              <a:t>Citation/DOI</a:t>
+            </a:r>
+            <a:endParaRPr lang="en-US" dirty="0" smtClean="0"/>
+          </a:p>
+          <a:p>
+            <a:pPr marL="0" indent="0">
+              <a:buNone/>
             </a:pPr>
             <a:endParaRPr lang="en-US" dirty="0"/>
           </a:p>
@@ -5487,7 +5685,7 @@
       </p:pic>
       <p:pic>
         <p:nvPicPr>
-          <p:cNvPr id="6" name="Picture 5"/>
+          <p:cNvPr id="4" name="Picture 3"/>
           <p:cNvPicPr>
             <a:picLocks noChangeAspect="1"/>
           </p:cNvPicPr>
@@ -5507,8 +5705,8 @@
         </p:blipFill>
         <p:spPr>
           <a:xfrm>
-            <a:off x="5731462" y="4492206"/>
-            <a:ext cx="1396401" cy="1675681"/>
+            <a:off x="4158859" y="4338752"/>
+            <a:ext cx="1740236" cy="1459623"/>
           </a:xfrm>
           <a:prstGeom prst="rect">
             <a:avLst/>

</xml_diff>

<commit_message>
Replace presentation with revision
</commit_message>
<xml_diff>
--- a/Building an Information Management Code Library.pptx
+++ b/Building an Information Management Code Library.pptx
@@ -121,6 +121,10 @@
 </p:presentation>
 </file>
 
+<file path=ppt/revisionInfo.xml><?xml version="1.0" encoding="utf-8"?>
+<p1510:revInfo xmlns:a="http://schemas.openxmlformats.org/drawingml/2006/main" xmlns:r="http://schemas.openxmlformats.org/officeDocument/2006/relationships" xmlns:p1510="http://schemas.microsoft.com/office/powerpoint/2015/10/main"/>
+</file>
+
 <file path=ppt/slideLayouts/slideLayout1.xml><?xml version="1.0" encoding="utf-8"?>
 <p:sldLayout xmlns:a="http://schemas.openxmlformats.org/drawingml/2006/main" xmlns:r="http://schemas.openxmlformats.org/officeDocument/2006/relationships" xmlns:p="http://schemas.openxmlformats.org/presentationml/2006/main" showMasterSp="0" type="title" preserve="1">
   <p:cSld name="Title Slide">
@@ -251,7 +255,7 @@
           </a:lstStyle>
           <a:p>
             <a:r>
-              <a:rPr lang="en-US" smtClean="0"/>
+              <a:rPr lang="en-US"/>
               <a:t>Click to edit Master title style</a:t>
             </a:r>
             <a:endParaRPr lang="en-US" dirty="0"/>
@@ -323,7 +327,7 @@
           </a:lstStyle>
           <a:p>
             <a:r>
-              <a:rPr lang="en-US" smtClean="0"/>
+              <a:rPr lang="en-US"/>
               <a:t>Click to edit Master subtitle style</a:t>
             </a:r>
             <a:endParaRPr lang="en-US" dirty="0"/>
@@ -347,7 +351,7 @@
           <a:p>
             <a:fld id="{CA364462-489C-44DB-9AFB-A6D942F03258}" type="datetimeFigureOut">
               <a:rPr lang="en-US" smtClean="0"/>
-              <a:t>7/19/2017</a:t>
+              <a:t>7/21/2017</a:t>
             </a:fld>
             <a:endParaRPr lang="en-US"/>
           </a:p>
@@ -369,10 +373,9 @@
           <a:lstStyle/>
           <a:p>
             <a:r>
-              <a:rPr lang="en-US" dirty="0" smtClean="0"/>
+              <a:rPr lang="en-US" dirty="0"/>
               <a:t>ESIP Meeting July 24-28, 2017</a:t>
             </a:r>
-            <a:endParaRPr lang="en-US" dirty="0"/>
           </a:p>
         </p:txBody>
       </p:sp>
@@ -513,7 +516,7 @@
           <a:lstStyle/>
           <a:p>
             <a:r>
-              <a:rPr lang="en-US" smtClean="0"/>
+              <a:rPr lang="en-US"/>
               <a:t>Click to edit Master title style</a:t>
             </a:r>
             <a:endParaRPr lang="en-US" dirty="0"/>
@@ -537,35 +540,35 @@
           <a:p>
             <a:pPr lvl="0"/>
             <a:r>
-              <a:rPr lang="en-US" smtClean="0"/>
+              <a:rPr lang="en-US"/>
               <a:t>Click to edit Master text styles</a:t>
             </a:r>
           </a:p>
           <a:p>
             <a:pPr lvl="1"/>
             <a:r>
-              <a:rPr lang="en-US" smtClean="0"/>
+              <a:rPr lang="en-US"/>
               <a:t>Second level</a:t>
             </a:r>
           </a:p>
           <a:p>
             <a:pPr lvl="2"/>
             <a:r>
-              <a:rPr lang="en-US" smtClean="0"/>
+              <a:rPr lang="en-US"/>
               <a:t>Third level</a:t>
             </a:r>
           </a:p>
           <a:p>
             <a:pPr lvl="3"/>
             <a:r>
-              <a:rPr lang="en-US" smtClean="0"/>
+              <a:rPr lang="en-US"/>
               <a:t>Fourth level</a:t>
             </a:r>
           </a:p>
           <a:p>
             <a:pPr lvl="4"/>
             <a:r>
-              <a:rPr lang="en-US" smtClean="0"/>
+              <a:rPr lang="en-US"/>
               <a:t>Fifth level</a:t>
             </a:r>
             <a:endParaRPr lang="en-US" dirty="0"/>
@@ -589,7 +592,7 @@
           <a:p>
             <a:fld id="{CA364462-489C-44DB-9AFB-A6D942F03258}" type="datetimeFigureOut">
               <a:rPr lang="en-US" smtClean="0"/>
-              <a:t>7/19/2017</a:t>
+              <a:t>7/21/2017</a:t>
             </a:fld>
             <a:endParaRPr lang="en-US"/>
           </a:p>
@@ -764,7 +767,7 @@
           <a:lstStyle/>
           <a:p>
             <a:r>
-              <a:rPr lang="en-US" smtClean="0"/>
+              <a:rPr lang="en-US"/>
               <a:t>Click to edit Master title style</a:t>
             </a:r>
             <a:endParaRPr lang="en-US" dirty="0"/>
@@ -793,35 +796,35 @@
           <a:p>
             <a:pPr lvl="0"/>
             <a:r>
-              <a:rPr lang="en-US" smtClean="0"/>
+              <a:rPr lang="en-US"/>
               <a:t>Click to edit Master text styles</a:t>
             </a:r>
           </a:p>
           <a:p>
             <a:pPr lvl="1"/>
             <a:r>
-              <a:rPr lang="en-US" smtClean="0"/>
+              <a:rPr lang="en-US"/>
               <a:t>Second level</a:t>
             </a:r>
           </a:p>
           <a:p>
             <a:pPr lvl="2"/>
             <a:r>
-              <a:rPr lang="en-US" smtClean="0"/>
+              <a:rPr lang="en-US"/>
               <a:t>Third level</a:t>
             </a:r>
           </a:p>
           <a:p>
             <a:pPr lvl="3"/>
             <a:r>
-              <a:rPr lang="en-US" smtClean="0"/>
+              <a:rPr lang="en-US"/>
               <a:t>Fourth level</a:t>
             </a:r>
           </a:p>
           <a:p>
             <a:pPr lvl="4"/>
             <a:r>
-              <a:rPr lang="en-US" smtClean="0"/>
+              <a:rPr lang="en-US"/>
               <a:t>Fifth level</a:t>
             </a:r>
             <a:endParaRPr lang="en-US" dirty="0"/>
@@ -845,7 +848,7 @@
           <a:p>
             <a:fld id="{CA364462-489C-44DB-9AFB-A6D942F03258}" type="datetimeFigureOut">
               <a:rPr lang="en-US" smtClean="0"/>
-              <a:t>7/19/2017</a:t>
+              <a:t>7/21/2017</a:t>
             </a:fld>
             <a:endParaRPr lang="en-US"/>
           </a:p>
@@ -943,7 +946,7 @@
           </a:lstStyle>
           <a:p>
             <a:r>
-              <a:rPr lang="en-US" smtClean="0"/>
+              <a:rPr lang="en-US"/>
               <a:t>Click to edit Master title style</a:t>
             </a:r>
             <a:endParaRPr lang="en-US" dirty="0"/>
@@ -967,35 +970,35 @@
           <a:p>
             <a:pPr lvl="0"/>
             <a:r>
-              <a:rPr lang="en-US" smtClean="0"/>
+              <a:rPr lang="en-US"/>
               <a:t>Click to edit Master text styles</a:t>
             </a:r>
           </a:p>
           <a:p>
             <a:pPr lvl="1"/>
             <a:r>
-              <a:rPr lang="en-US" smtClean="0"/>
+              <a:rPr lang="en-US"/>
               <a:t>Second level</a:t>
             </a:r>
           </a:p>
           <a:p>
             <a:pPr lvl="2"/>
             <a:r>
-              <a:rPr lang="en-US" smtClean="0"/>
+              <a:rPr lang="en-US"/>
               <a:t>Third level</a:t>
             </a:r>
           </a:p>
           <a:p>
             <a:pPr lvl="3"/>
             <a:r>
-              <a:rPr lang="en-US" smtClean="0"/>
+              <a:rPr lang="en-US"/>
               <a:t>Fourth level</a:t>
             </a:r>
           </a:p>
           <a:p>
             <a:pPr lvl="4"/>
             <a:r>
-              <a:rPr lang="en-US" smtClean="0"/>
+              <a:rPr lang="en-US"/>
               <a:t>Fifth level</a:t>
             </a:r>
             <a:endParaRPr lang="en-US" dirty="0"/>
@@ -1019,7 +1022,7 @@
           <a:p>
             <a:fld id="{CA364462-489C-44DB-9AFB-A6D942F03258}" type="datetimeFigureOut">
               <a:rPr lang="en-US" smtClean="0"/>
-              <a:t>7/19/2017</a:t>
+              <a:t>7/21/2017</a:t>
             </a:fld>
             <a:endParaRPr lang="en-US"/>
           </a:p>
@@ -1041,10 +1044,9 @@
           <a:lstStyle/>
           <a:p>
             <a:r>
-              <a:rPr lang="en-US" dirty="0" smtClean="0"/>
+              <a:rPr lang="en-US" dirty="0"/>
               <a:t>ESIP Meeting, July 24-28, 2017</a:t>
             </a:r>
-            <a:endParaRPr lang="en-US" dirty="0"/>
           </a:p>
         </p:txBody>
       </p:sp>
@@ -1252,7 +1254,7 @@
           </a:lstStyle>
           <a:p>
             <a:r>
-              <a:rPr lang="en-US" smtClean="0"/>
+              <a:rPr lang="en-US"/>
               <a:t>Click to edit Master title style</a:t>
             </a:r>
             <a:endParaRPr lang="en-US" dirty="0"/>
@@ -1373,7 +1375,7 @@
           <a:p>
             <a:pPr lvl="0"/>
             <a:r>
-              <a:rPr lang="en-US" smtClean="0"/>
+              <a:rPr lang="en-US"/>
               <a:t>Click to edit Master text styles</a:t>
             </a:r>
           </a:p>
@@ -1396,7 +1398,7 @@
           <a:p>
             <a:fld id="{CA364462-489C-44DB-9AFB-A6D942F03258}" type="datetimeFigureOut">
               <a:rPr lang="en-US" smtClean="0"/>
-              <a:t>7/19/2017</a:t>
+              <a:t>7/21/2017</a:t>
             </a:fld>
             <a:endParaRPr lang="en-US"/>
           </a:p>
@@ -1533,7 +1535,7 @@
           <a:lstStyle/>
           <a:p>
             <a:r>
-              <a:rPr lang="en-US" smtClean="0"/>
+              <a:rPr lang="en-US"/>
               <a:t>Click to edit Master title style</a:t>
             </a:r>
             <a:endParaRPr lang="en-US" dirty="0"/>
@@ -1562,35 +1564,35 @@
           <a:p>
             <a:pPr lvl="0"/>
             <a:r>
-              <a:rPr lang="en-US" smtClean="0"/>
+              <a:rPr lang="en-US"/>
               <a:t>Click to edit Master text styles</a:t>
             </a:r>
           </a:p>
           <a:p>
             <a:pPr lvl="1"/>
             <a:r>
-              <a:rPr lang="en-US" smtClean="0"/>
+              <a:rPr lang="en-US"/>
               <a:t>Second level</a:t>
             </a:r>
           </a:p>
           <a:p>
             <a:pPr lvl="2"/>
             <a:r>
-              <a:rPr lang="en-US" smtClean="0"/>
+              <a:rPr lang="en-US"/>
               <a:t>Third level</a:t>
             </a:r>
           </a:p>
           <a:p>
             <a:pPr lvl="3"/>
             <a:r>
-              <a:rPr lang="en-US" smtClean="0"/>
+              <a:rPr lang="en-US"/>
               <a:t>Fourth level</a:t>
             </a:r>
           </a:p>
           <a:p>
             <a:pPr lvl="4"/>
             <a:r>
-              <a:rPr lang="en-US" smtClean="0"/>
+              <a:rPr lang="en-US"/>
               <a:t>Fifth level</a:t>
             </a:r>
             <a:endParaRPr lang="en-US" dirty="0"/>
@@ -1619,35 +1621,35 @@
           <a:p>
             <a:pPr lvl="0"/>
             <a:r>
-              <a:rPr lang="en-US" smtClean="0"/>
+              <a:rPr lang="en-US"/>
               <a:t>Click to edit Master text styles</a:t>
             </a:r>
           </a:p>
           <a:p>
             <a:pPr lvl="1"/>
             <a:r>
-              <a:rPr lang="en-US" smtClean="0"/>
+              <a:rPr lang="en-US"/>
               <a:t>Second level</a:t>
             </a:r>
           </a:p>
           <a:p>
             <a:pPr lvl="2"/>
             <a:r>
-              <a:rPr lang="en-US" smtClean="0"/>
+              <a:rPr lang="en-US"/>
               <a:t>Third level</a:t>
             </a:r>
           </a:p>
           <a:p>
             <a:pPr lvl="3"/>
             <a:r>
-              <a:rPr lang="en-US" smtClean="0"/>
+              <a:rPr lang="en-US"/>
               <a:t>Fourth level</a:t>
             </a:r>
           </a:p>
           <a:p>
             <a:pPr lvl="4"/>
             <a:r>
-              <a:rPr lang="en-US" smtClean="0"/>
+              <a:rPr lang="en-US"/>
               <a:t>Fifth level</a:t>
             </a:r>
             <a:endParaRPr lang="en-US" dirty="0"/>
@@ -1671,7 +1673,7 @@
           <a:p>
             <a:fld id="{CA364462-489C-44DB-9AFB-A6D942F03258}" type="datetimeFigureOut">
               <a:rPr lang="en-US" smtClean="0"/>
-              <a:t>7/19/2017</a:t>
+              <a:t>7/21/2017</a:t>
             </a:fld>
             <a:endParaRPr lang="en-US"/>
           </a:p>
@@ -1770,7 +1772,7 @@
           <a:lstStyle/>
           <a:p>
             <a:r>
-              <a:rPr lang="en-US" smtClean="0"/>
+              <a:rPr lang="en-US"/>
               <a:t>Click to edit Master title style</a:t>
             </a:r>
             <a:endParaRPr lang="en-US" dirty="0"/>
@@ -1842,7 +1844,7 @@
           <a:p>
             <a:pPr lvl="0"/>
             <a:r>
-              <a:rPr lang="en-US" smtClean="0"/>
+              <a:rPr lang="en-US"/>
               <a:t>Click to edit Master text styles</a:t>
             </a:r>
           </a:p>
@@ -1870,35 +1872,35 @@
           <a:p>
             <a:pPr lvl="0"/>
             <a:r>
-              <a:rPr lang="en-US" smtClean="0"/>
+              <a:rPr lang="en-US"/>
               <a:t>Click to edit Master text styles</a:t>
             </a:r>
           </a:p>
           <a:p>
             <a:pPr lvl="1"/>
             <a:r>
-              <a:rPr lang="en-US" smtClean="0"/>
+              <a:rPr lang="en-US"/>
               <a:t>Second level</a:t>
             </a:r>
           </a:p>
           <a:p>
             <a:pPr lvl="2"/>
             <a:r>
-              <a:rPr lang="en-US" smtClean="0"/>
+              <a:rPr lang="en-US"/>
               <a:t>Third level</a:t>
             </a:r>
           </a:p>
           <a:p>
             <a:pPr lvl="3"/>
             <a:r>
-              <a:rPr lang="en-US" smtClean="0"/>
+              <a:rPr lang="en-US"/>
               <a:t>Fourth level</a:t>
             </a:r>
           </a:p>
           <a:p>
             <a:pPr lvl="4"/>
             <a:r>
-              <a:rPr lang="en-US" smtClean="0"/>
+              <a:rPr lang="en-US"/>
               <a:t>Fifth level</a:t>
             </a:r>
             <a:endParaRPr lang="en-US" dirty="0"/>
@@ -1970,7 +1972,7 @@
           <a:p>
             <a:pPr lvl="0"/>
             <a:r>
-              <a:rPr lang="en-US" smtClean="0"/>
+              <a:rPr lang="en-US"/>
               <a:t>Click to edit Master text styles</a:t>
             </a:r>
           </a:p>
@@ -1998,35 +2000,35 @@
           <a:p>
             <a:pPr lvl="0"/>
             <a:r>
-              <a:rPr lang="en-US" smtClean="0"/>
+              <a:rPr lang="en-US"/>
               <a:t>Click to edit Master text styles</a:t>
             </a:r>
           </a:p>
           <a:p>
             <a:pPr lvl="1"/>
             <a:r>
-              <a:rPr lang="en-US" smtClean="0"/>
+              <a:rPr lang="en-US"/>
               <a:t>Second level</a:t>
             </a:r>
           </a:p>
           <a:p>
             <a:pPr lvl="2"/>
             <a:r>
-              <a:rPr lang="en-US" smtClean="0"/>
+              <a:rPr lang="en-US"/>
               <a:t>Third level</a:t>
             </a:r>
           </a:p>
           <a:p>
             <a:pPr lvl="3"/>
             <a:r>
-              <a:rPr lang="en-US" smtClean="0"/>
+              <a:rPr lang="en-US"/>
               <a:t>Fourth level</a:t>
             </a:r>
           </a:p>
           <a:p>
             <a:pPr lvl="4"/>
             <a:r>
-              <a:rPr lang="en-US" smtClean="0"/>
+              <a:rPr lang="en-US"/>
               <a:t>Fifth level</a:t>
             </a:r>
             <a:endParaRPr lang="en-US" dirty="0"/>
@@ -2050,7 +2052,7 @@
           <a:p>
             <a:fld id="{CA364462-489C-44DB-9AFB-A6D942F03258}" type="datetimeFigureOut">
               <a:rPr lang="en-US" smtClean="0"/>
-              <a:t>7/19/2017</a:t>
+              <a:t>7/21/2017</a:t>
             </a:fld>
             <a:endParaRPr lang="en-US"/>
           </a:p>
@@ -2144,7 +2146,7 @@
           <a:lstStyle/>
           <a:p>
             <a:r>
-              <a:rPr lang="en-US" smtClean="0"/>
+              <a:rPr lang="en-US"/>
               <a:t>Click to edit Master title style</a:t>
             </a:r>
             <a:endParaRPr lang="en-US" dirty="0"/>
@@ -2168,7 +2170,7 @@
           <a:p>
             <a:fld id="{CA364462-489C-44DB-9AFB-A6D942F03258}" type="datetimeFigureOut">
               <a:rPr lang="en-US" smtClean="0"/>
-              <a:t>7/19/2017</a:t>
+              <a:t>7/21/2017</a:t>
             </a:fld>
             <a:endParaRPr lang="en-US"/>
           </a:p>
@@ -2339,7 +2341,7 @@
           <a:p>
             <a:fld id="{CA364462-489C-44DB-9AFB-A6D942F03258}" type="datetimeFigureOut">
               <a:rPr lang="en-US" smtClean="0"/>
-              <a:t>7/19/2017</a:t>
+              <a:t>7/21/2017</a:t>
             </a:fld>
             <a:endParaRPr lang="en-US"/>
           </a:p>
@@ -2532,7 +2534,7 @@
           </a:lstStyle>
           <a:p>
             <a:r>
-              <a:rPr lang="en-US" smtClean="0"/>
+              <a:rPr lang="en-US"/>
               <a:t>Click to edit Master title style</a:t>
             </a:r>
             <a:endParaRPr lang="en-US" dirty="0"/>
@@ -2561,35 +2563,35 @@
           <a:p>
             <a:pPr lvl="0"/>
             <a:r>
-              <a:rPr lang="en-US" smtClean="0"/>
+              <a:rPr lang="en-US"/>
               <a:t>Click to edit Master text styles</a:t>
             </a:r>
           </a:p>
           <a:p>
             <a:pPr lvl="1"/>
             <a:r>
-              <a:rPr lang="en-US" smtClean="0"/>
+              <a:rPr lang="en-US"/>
               <a:t>Second level</a:t>
             </a:r>
           </a:p>
           <a:p>
             <a:pPr lvl="2"/>
             <a:r>
-              <a:rPr lang="en-US" smtClean="0"/>
+              <a:rPr lang="en-US"/>
               <a:t>Third level</a:t>
             </a:r>
           </a:p>
           <a:p>
             <a:pPr lvl="3"/>
             <a:r>
-              <a:rPr lang="en-US" smtClean="0"/>
+              <a:rPr lang="en-US"/>
               <a:t>Fourth level</a:t>
             </a:r>
           </a:p>
           <a:p>
             <a:pPr lvl="4"/>
             <a:r>
-              <a:rPr lang="en-US" smtClean="0"/>
+              <a:rPr lang="en-US"/>
               <a:t>Fifth level</a:t>
             </a:r>
             <a:endParaRPr lang="en-US" dirty="0"/>
@@ -2661,7 +2663,7 @@
           <a:p>
             <a:pPr lvl="0"/>
             <a:r>
-              <a:rPr lang="en-US" smtClean="0"/>
+              <a:rPr lang="en-US"/>
               <a:t>Click to edit Master text styles</a:t>
             </a:r>
           </a:p>
@@ -2693,7 +2695,7 @@
           <a:p>
             <a:fld id="{CA364462-489C-44DB-9AFB-A6D942F03258}" type="datetimeFigureOut">
               <a:rPr lang="en-US" smtClean="0"/>
-              <a:t>7/19/2017</a:t>
+              <a:t>7/21/2017</a:t>
             </a:fld>
             <a:endParaRPr lang="en-US"/>
           </a:p>
@@ -2899,7 +2901,7 @@
           </a:lstStyle>
           <a:p>
             <a:r>
-              <a:rPr lang="en-US" smtClean="0"/>
+              <a:rPr lang="en-US"/>
               <a:t>Click to edit Master title style</a:t>
             </a:r>
             <a:endParaRPr lang="en-US" dirty="0"/>
@@ -2974,7 +2976,7 @@
           </a:lstStyle>
           <a:p>
             <a:r>
-              <a:rPr lang="en-US" smtClean="0"/>
+              <a:rPr lang="en-US"/>
               <a:t>Click icon to add picture</a:t>
             </a:r>
             <a:endParaRPr lang="en-US" dirty="0"/>
@@ -3052,7 +3054,7 @@
           <a:p>
             <a:pPr lvl="0"/>
             <a:r>
-              <a:rPr lang="en-US" smtClean="0"/>
+              <a:rPr lang="en-US"/>
               <a:t>Click to edit Master text styles</a:t>
             </a:r>
           </a:p>
@@ -3075,7 +3077,7 @@
           <a:p>
             <a:fld id="{CA364462-489C-44DB-9AFB-A6D942F03258}" type="datetimeFigureOut">
               <a:rPr lang="en-US" smtClean="0"/>
-              <a:t>7/19/2017</a:t>
+              <a:t>7/21/2017</a:t>
             </a:fld>
             <a:endParaRPr lang="en-US"/>
           </a:p>
@@ -3260,7 +3262,7 @@
           <a:lstStyle/>
           <a:p>
             <a:r>
-              <a:rPr lang="en-US" smtClean="0"/>
+              <a:rPr lang="en-US"/>
               <a:t>Click to edit Master title style</a:t>
             </a:r>
             <a:endParaRPr lang="en-US" dirty="0"/>
@@ -3294,35 +3296,35 @@
           <a:p>
             <a:pPr lvl="0"/>
             <a:r>
-              <a:rPr lang="en-US" smtClean="0"/>
+              <a:rPr lang="en-US"/>
               <a:t>Click to edit Master text styles</a:t>
             </a:r>
           </a:p>
           <a:p>
             <a:pPr lvl="1"/>
             <a:r>
-              <a:rPr lang="en-US" smtClean="0"/>
+              <a:rPr lang="en-US"/>
               <a:t>Second level</a:t>
             </a:r>
           </a:p>
           <a:p>
             <a:pPr lvl="2"/>
             <a:r>
-              <a:rPr lang="en-US" smtClean="0"/>
+              <a:rPr lang="en-US"/>
               <a:t>Third level</a:t>
             </a:r>
           </a:p>
           <a:p>
             <a:pPr lvl="3"/>
             <a:r>
-              <a:rPr lang="en-US" smtClean="0"/>
+              <a:rPr lang="en-US"/>
               <a:t>Fourth level</a:t>
             </a:r>
           </a:p>
           <a:p>
             <a:pPr lvl="4"/>
             <a:r>
-              <a:rPr lang="en-US" smtClean="0"/>
+              <a:rPr lang="en-US"/>
               <a:t>Fifth level</a:t>
             </a:r>
             <a:endParaRPr lang="en-US" dirty="0"/>
@@ -3362,7 +3364,7 @@
           <a:p>
             <a:fld id="{CA364462-489C-44DB-9AFB-A6D942F03258}" type="datetimeFigureOut">
               <a:rPr lang="en-US" smtClean="0"/>
-              <a:t>7/19/2017</a:t>
+              <a:t>7/21/2017</a:t>
             </a:fld>
             <a:endParaRPr lang="en-US"/>
           </a:p>
@@ -3909,10 +3911,9 @@
           <a:lstStyle/>
           <a:p>
             <a:r>
-              <a:rPr lang="en-US" dirty="0" smtClean="0"/>
+              <a:rPr lang="en-US" dirty="0"/>
               <a:t>Developing an Information Management Code Repository</a:t>
             </a:r>
-            <a:endParaRPr lang="en-US" dirty="0"/>
           </a:p>
         </p:txBody>
       </p:sp>
@@ -3934,22 +3935,21 @@
           <a:lstStyle/>
           <a:p>
             <a:r>
-              <a:rPr lang="en-US" dirty="0" smtClean="0"/>
+              <a:rPr lang="en-US" dirty="0"/>
               <a:t>Kristin Vanderbilt</a:t>
             </a:r>
           </a:p>
           <a:p>
             <a:r>
-              <a:rPr lang="en-US" dirty="0" smtClean="0"/>
+              <a:rPr lang="en-US" dirty="0"/>
               <a:t>Colin Smith</a:t>
             </a:r>
           </a:p>
           <a:p>
             <a:r>
-              <a:rPr lang="en-US" dirty="0" smtClean="0"/>
+              <a:rPr lang="en-US" dirty="0"/>
               <a:t>Environmental Data Initiative</a:t>
             </a:r>
-            <a:endParaRPr lang="en-US" dirty="0"/>
           </a:p>
         </p:txBody>
       </p:sp>
@@ -3963,13 +3963,6 @@
   <p:clrMapOvr>
     <a:masterClrMapping/>
   </p:clrMapOvr>
-  <p:timing>
-    <p:tnLst>
-      <p:par>
-        <p:cTn id="1" dur="indefinite" restart="never" nodeType="tmRoot"/>
-      </p:par>
-    </p:tnLst>
-  </p:timing>
 </p:sld>
 </file>
 
@@ -4006,10 +3999,9 @@
           <a:lstStyle/>
           <a:p>
             <a:r>
-              <a:rPr lang="en-US" dirty="0" smtClean="0"/>
+              <a:rPr lang="en-US" dirty="0"/>
               <a:t>Join us to finish the IM Repository blueprint!</a:t>
             </a:r>
-            <a:endParaRPr lang="en-US" dirty="0"/>
           </a:p>
         </p:txBody>
       </p:sp>
@@ -4033,26 +4025,9 @@
               <a:buChar char="q"/>
             </a:pPr>
             <a:r>
-              <a:rPr lang="en-US" dirty="0" smtClean="0"/>
-              <a:t>Volunteers sought to co-author </a:t>
-            </a:r>
-            <a:r>
-              <a:rPr lang="en-US" dirty="0" smtClean="0"/>
-              <a:t>or</a:t>
-            </a:r>
-            <a:r>
-              <a:rPr lang="en-US" dirty="0" smtClean="0"/>
-              <a:t> </a:t>
-            </a:r>
-            <a:r>
-              <a:rPr lang="en-US" dirty="0" smtClean="0"/>
-              <a:t>review the ‘blueprint</a:t>
-            </a:r>
-            <a:r>
-              <a:rPr lang="en-US" dirty="0" smtClean="0"/>
-              <a:t>’</a:t>
-            </a:r>
-            <a:endParaRPr lang="en-US" dirty="0"/>
+              <a:rPr lang="en-US" dirty="0"/>
+              <a:t>Volunteers sought to co-author or review the ‘blueprint’</a:t>
+            </a:r>
           </a:p>
         </p:txBody>
       </p:sp>
@@ -4132,10 +4107,9 @@
           <a:lstStyle/>
           <a:p>
             <a:r>
-              <a:rPr lang="en-US" dirty="0" smtClean="0"/>
+              <a:rPr lang="en-US" dirty="0"/>
               <a:t>What is the IM code repository?</a:t>
             </a:r>
-            <a:endParaRPr lang="en-US" dirty="0"/>
           </a:p>
         </p:txBody>
       </p:sp>
@@ -4159,28 +4133,8 @@
               <a:buChar char="q"/>
             </a:pPr>
             <a:r>
-              <a:rPr lang="en-US" dirty="0" smtClean="0"/>
-              <a:t>A </a:t>
-            </a:r>
-            <a:r>
-              <a:rPr lang="en-US" dirty="0" smtClean="0"/>
-              <a:t>community space </a:t>
-            </a:r>
-            <a:r>
-              <a:rPr lang="en-US" dirty="0" smtClean="0"/>
-              <a:t>where </a:t>
-            </a:r>
-            <a:r>
-              <a:rPr lang="en-US" dirty="0" smtClean="0"/>
-              <a:t>participants </a:t>
-            </a:r>
-            <a:r>
-              <a:rPr lang="en-US" dirty="0" smtClean="0"/>
-              <a:t>contribute code and discover code to </a:t>
-            </a:r>
-            <a:r>
-              <a:rPr lang="en-US" dirty="0" smtClean="0"/>
-              <a:t>re-use</a:t>
+              <a:rPr lang="en-US" dirty="0"/>
+              <a:t>A community space where participants contribute code and discover code to re-use</a:t>
             </a:r>
           </a:p>
           <a:p>
@@ -4189,7 +4143,7 @@
               <a:buChar char="q"/>
             </a:pPr>
             <a:r>
-              <a:rPr lang="en-US" dirty="0" smtClean="0"/>
+              <a:rPr lang="en-US" dirty="0"/>
               <a:t>For Information Managers, scientists, students, others</a:t>
             </a:r>
           </a:p>
@@ -4199,7 +4153,7 @@
               <a:buChar char="q"/>
             </a:pPr>
             <a:r>
-              <a:rPr lang="en-US" dirty="0" smtClean="0"/>
+              <a:rPr lang="en-US" dirty="0"/>
               <a:t>Limited to code for IM tasks</a:t>
             </a:r>
           </a:p>
@@ -4209,7 +4163,7 @@
               <a:buChar char="q"/>
             </a:pPr>
             <a:r>
-              <a:rPr lang="en-US" dirty="0" smtClean="0"/>
+              <a:rPr lang="en-US" dirty="0"/>
               <a:t>Language agnostic</a:t>
             </a:r>
           </a:p>
@@ -4218,34 +4172,34 @@
               <a:buFont typeface="Wingdings" panose="05000000000000000000" pitchFamily="2" charset="2"/>
               <a:buChar char="q"/>
             </a:pPr>
-            <a:endParaRPr lang="en-US" dirty="0" smtClean="0"/>
+            <a:endParaRPr lang="en-US" dirty="0"/>
           </a:p>
           <a:p>
             <a:pPr lvl="1">
               <a:buFont typeface="Wingdings" panose="05000000000000000000" pitchFamily="2" charset="2"/>
               <a:buChar char="q"/>
             </a:pPr>
-            <a:endParaRPr lang="en-US" dirty="0" smtClean="0"/>
+            <a:endParaRPr lang="en-US" dirty="0"/>
           </a:p>
           <a:p>
             <a:pPr lvl="1">
               <a:buFont typeface="Wingdings" panose="05000000000000000000" pitchFamily="2" charset="2"/>
               <a:buChar char="q"/>
             </a:pPr>
-            <a:endParaRPr lang="en-US" dirty="0" smtClean="0"/>
+            <a:endParaRPr lang="en-US" dirty="0"/>
           </a:p>
           <a:p>
             <a:pPr lvl="1">
               <a:buFont typeface="Wingdings" panose="05000000000000000000" pitchFamily="2" charset="2"/>
               <a:buChar char="q"/>
             </a:pPr>
-            <a:endParaRPr lang="en-US" dirty="0" smtClean="0"/>
+            <a:endParaRPr lang="en-US" dirty="0"/>
           </a:p>
           <a:p>
             <a:pPr marL="201168" lvl="1" indent="0">
               <a:buNone/>
             </a:pPr>
-            <a:endParaRPr lang="en-US" dirty="0" smtClean="0"/>
+            <a:endParaRPr lang="en-US" dirty="0"/>
           </a:p>
         </p:txBody>
       </p:sp>
@@ -4439,13 +4393,6 @@
   <p:clrMapOvr>
     <a:masterClrMapping/>
   </p:clrMapOvr>
-  <p:timing>
-    <p:tnLst>
-      <p:par>
-        <p:cTn id="1" dur="indefinite" restart="never" nodeType="tmRoot"/>
-      </p:par>
-    </p:tnLst>
-  </p:timing>
 </p:sld>
 </file>
 
@@ -4482,10 +4429,9 @@
           <a:lstStyle/>
           <a:p>
             <a:r>
-              <a:rPr lang="en-US" dirty="0" smtClean="0"/>
+              <a:rPr lang="en-US" dirty="0"/>
               <a:t>Our goal today…</a:t>
             </a:r>
-            <a:endParaRPr lang="en-US" dirty="0"/>
           </a:p>
         </p:txBody>
       </p:sp>
@@ -4505,12 +4451,8 @@
           <a:lstStyle/>
           <a:p>
             <a:r>
-              <a:rPr lang="en-US" dirty="0" smtClean="0"/>
-              <a:t>…is </a:t>
-            </a:r>
-            <a:r>
-              <a:rPr lang="en-US" dirty="0"/>
-              <a:t>to create a </a:t>
+              <a:rPr lang="en-US" dirty="0"/>
+              <a:t>…is to create a </a:t>
             </a:r>
             <a:r>
               <a:rPr lang="en-US" i="1" dirty="0"/>
@@ -4602,14 +4544,9 @@
           <a:lstStyle/>
           <a:p>
             <a:r>
-              <a:rPr lang="en-US" dirty="0" smtClean="0"/>
-              <a:t>Considerations</a:t>
-            </a:r>
-            <a:r>
-              <a:rPr lang="en-US" dirty="0" smtClean="0"/>
-              <a:t>:</a:t>
-            </a:r>
-            <a:endParaRPr lang="en-US" dirty="0"/>
+              <a:rPr lang="en-US" dirty="0"/>
+              <a:t>Considerations:</a:t>
+            </a:r>
           </a:p>
         </p:txBody>
       </p:sp>
@@ -4633,7 +4570,7 @@
               <a:buChar char="q"/>
             </a:pPr>
             <a:r>
-              <a:rPr lang="en-US" dirty="0" smtClean="0"/>
+              <a:rPr lang="en-US" dirty="0"/>
               <a:t>Repository</a:t>
             </a:r>
           </a:p>
@@ -4643,10 +4580,9 @@
               <a:buChar char="q"/>
             </a:pPr>
             <a:r>
-              <a:rPr lang="en-US" dirty="0" smtClean="0"/>
+              <a:rPr lang="en-US" dirty="0"/>
               <a:t>Structure</a:t>
             </a:r>
-            <a:endParaRPr lang="en-US" dirty="0"/>
           </a:p>
           <a:p>
             <a:pPr lvl="1">
@@ -4654,7 +4590,7 @@
               <a:buChar char="q"/>
             </a:pPr>
             <a:r>
-              <a:rPr lang="en-US" dirty="0" smtClean="0"/>
+              <a:rPr lang="en-US" dirty="0"/>
               <a:t>Governance</a:t>
             </a:r>
           </a:p>
@@ -4664,10 +4600,9 @@
               <a:buChar char="q"/>
             </a:pPr>
             <a:r>
-              <a:rPr lang="en-US" dirty="0" smtClean="0"/>
+              <a:rPr lang="en-US" dirty="0"/>
               <a:t>Code</a:t>
             </a:r>
-            <a:endParaRPr lang="en-US" dirty="0"/>
           </a:p>
           <a:p>
             <a:pPr lvl="1">
@@ -4675,8 +4610,8 @@
               <a:buChar char="q"/>
             </a:pPr>
             <a:r>
-              <a:rPr lang="en-US" dirty="0" smtClean="0"/>
-              <a:t>Reusability</a:t>
+              <a:rPr lang="en-US" dirty="0"/>
+              <a:t>Minimum requirements</a:t>
             </a:r>
           </a:p>
           <a:p>
@@ -4690,17 +4625,27 @@
             </a:r>
           </a:p>
           <a:p>
-            <a:pPr marL="201168" lvl="1" indent="0">
-              <a:buNone/>
-            </a:pPr>
-            <a:endParaRPr lang="en-US" dirty="0" smtClean="0"/>
-          </a:p>
-          <a:p>
             <a:pPr>
               <a:buFont typeface="Wingdings" panose="05000000000000000000" pitchFamily="2" charset="2"/>
               <a:buChar char="q"/>
             </a:pPr>
-            <a:endParaRPr lang="en-US" dirty="0" smtClean="0"/>
+            <a:r>
+              <a:rPr lang="en-US" dirty="0"/>
+              <a:t>Other considerations?</a:t>
+            </a:r>
+          </a:p>
+          <a:p>
+            <a:pPr marL="201168" lvl="1" indent="0">
+              <a:buNone/>
+            </a:pPr>
+            <a:endParaRPr lang="en-US" dirty="0"/>
+          </a:p>
+          <a:p>
+            <a:pPr>
+              <a:buFont typeface="Wingdings" panose="05000000000000000000" pitchFamily="2" charset="2"/>
+              <a:buChar char="q"/>
+            </a:pPr>
+            <a:endParaRPr lang="en-US" dirty="0"/>
           </a:p>
         </p:txBody>
       </p:sp>
@@ -4780,10 +4725,9 @@
           <a:lstStyle/>
           <a:p>
             <a:r>
-              <a:rPr lang="en-US" dirty="0" smtClean="0"/>
+              <a:rPr lang="en-US" dirty="0"/>
               <a:t>How should the IM Code Repository be structured?</a:t>
             </a:r>
-            <a:endParaRPr lang="en-US" dirty="0"/>
           </a:p>
         </p:txBody>
       </p:sp>
@@ -4807,12 +4751,8 @@
               <a:buChar char="q"/>
             </a:pPr>
             <a:r>
-              <a:rPr lang="en-US" dirty="0" smtClean="0"/>
-              <a:t>Decentralized </a:t>
-            </a:r>
-            <a:r>
-              <a:rPr lang="en-US" dirty="0" smtClean="0"/>
-              <a:t>approach – the repository is essentially a catalog, pointing to whatever repository the code developer prefers</a:t>
+              <a:rPr lang="en-US" dirty="0"/>
+              <a:t>Decentralized approach – the repository is essentially a catalog, pointing to whatever repository the code developer prefers</a:t>
             </a:r>
           </a:p>
           <a:p>
@@ -4821,14 +4761,9 @@
               <a:buChar char="q"/>
             </a:pPr>
             <a:r>
-              <a:rPr lang="en-US" dirty="0" smtClean="0"/>
-              <a:t>Centralized approach – all code is in </a:t>
-            </a:r>
-            <a:r>
-              <a:rPr lang="en-US" dirty="0" err="1" smtClean="0"/>
-              <a:t>github</a:t>
-            </a:r>
-            <a:endParaRPr lang="en-US" dirty="0" smtClean="0"/>
+              <a:rPr lang="en-US" dirty="0"/>
+              <a:t>Centralized approach – all code is in one repository and managed by one group</a:t>
+            </a:r>
           </a:p>
           <a:p>
             <a:pPr>
@@ -4836,29 +4771,21 @@
               <a:buChar char="q"/>
             </a:pPr>
             <a:r>
-              <a:rPr lang="en-US" dirty="0" smtClean="0"/>
-              <a:t>Hybrid approach – a catalog plus the centralized </a:t>
-            </a:r>
-            <a:r>
-              <a:rPr lang="en-US" dirty="0" err="1" smtClean="0"/>
-              <a:t>github</a:t>
-            </a:r>
-            <a:r>
-              <a:rPr lang="en-US" dirty="0" smtClean="0"/>
-              <a:t> repository</a:t>
+              <a:rPr lang="en-US" dirty="0"/>
+              <a:t>Hybrid approach – the centralized repository with a catalog</a:t>
             </a:r>
           </a:p>
           <a:p>
             <a:pPr marL="0" indent="0">
               <a:buNone/>
             </a:pPr>
-            <a:endParaRPr lang="en-US" dirty="0" smtClean="0"/>
+            <a:endParaRPr lang="en-US" dirty="0"/>
           </a:p>
           <a:p>
             <a:pPr marL="0" indent="0">
               <a:buNone/>
             </a:pPr>
-            <a:endParaRPr lang="en-US" dirty="0" smtClean="0"/>
+            <a:endParaRPr lang="en-US" dirty="0"/>
           </a:p>
         </p:txBody>
       </p:sp>
@@ -4938,10 +4865,9 @@
           <a:lstStyle/>
           <a:p>
             <a:r>
-              <a:rPr lang="en-US" dirty="0" smtClean="0"/>
+              <a:rPr lang="en-US" dirty="0"/>
               <a:t>How should the code repository be governed?</a:t>
             </a:r>
-            <a:endParaRPr lang="en-US" dirty="0"/>
           </a:p>
         </p:txBody>
       </p:sp>
@@ -4957,7 +4883,9 @@
         </p:nvSpPr>
         <p:spPr/>
         <p:txBody>
-          <a:bodyPr/>
+          <a:bodyPr>
+            <a:normAutofit/>
+          </a:bodyPr>
           <a:lstStyle/>
           <a:p>
             <a:endParaRPr lang="en-US" dirty="0"/>
@@ -4979,17 +4907,8 @@
             </a:pPr>
             <a:r>
               <a:rPr lang="en-US" sz="2000" dirty="0"/>
-              <a:t>S</a:t>
-            </a:r>
-            <a:r>
-              <a:rPr lang="en-US" sz="2000" dirty="0" smtClean="0"/>
-              <a:t>pecialists </a:t>
-            </a:r>
-            <a:r>
-              <a:rPr lang="en-US" sz="2000" dirty="0"/>
-              <a:t>in different programming languages.   </a:t>
-            </a:r>
-            <a:endParaRPr lang="en-US" sz="2000" dirty="0" smtClean="0"/>
+              <a:t>Composed of IMs and code developers</a:t>
+            </a:r>
           </a:p>
           <a:p>
             <a:pPr lvl="2" fontAlgn="base">
@@ -4997,8 +4916,28 @@
               <a:buChar char="q"/>
             </a:pPr>
             <a:r>
-              <a:rPr lang="en-US" sz="2000" dirty="0" smtClean="0"/>
-              <a:t>Responsible for ensuring that code passes quality tests and for evaluating metadata for quality and completeness. </a:t>
+              <a:rPr lang="en-US" sz="2000" dirty="0"/>
+              <a:t>Responsible for:</a:t>
+            </a:r>
+          </a:p>
+          <a:p>
+            <a:pPr lvl="3" fontAlgn="base">
+              <a:buFont typeface="Wingdings" panose="05000000000000000000" pitchFamily="2" charset="2"/>
+              <a:buChar char="q"/>
+            </a:pPr>
+            <a:r>
+              <a:rPr lang="en-US" sz="2000" dirty="0"/>
+              <a:t> ensuring that code passes quality tests</a:t>
+            </a:r>
+          </a:p>
+          <a:p>
+            <a:pPr lvl="3" fontAlgn="base">
+              <a:buFont typeface="Wingdings" panose="05000000000000000000" pitchFamily="2" charset="2"/>
+              <a:buChar char="q"/>
+            </a:pPr>
+            <a:r>
+              <a:rPr lang="en-US" sz="2000" dirty="0"/>
+              <a:t> evaluating metadata for quality and completeness </a:t>
             </a:r>
           </a:p>
           <a:p>
@@ -5007,10 +4946,9 @@
               <a:buChar char="q"/>
             </a:pPr>
             <a:r>
-              <a:rPr lang="en-US" sz="2000" dirty="0" smtClean="0"/>
-              <a:t>Distributed workload. </a:t>
-            </a:r>
-            <a:endParaRPr lang="en-US" sz="2000" dirty="0"/>
+              <a:rPr lang="en-US" sz="2000" dirty="0"/>
+              <a:t>Distributed workload</a:t>
+            </a:r>
           </a:p>
           <a:p>
             <a:pPr lvl="2" fontAlgn="base">
@@ -5018,7 +4956,7 @@
               <a:buChar char="q"/>
             </a:pPr>
             <a:r>
-              <a:rPr lang="en-US" sz="2000" dirty="0" smtClean="0"/>
+              <a:rPr lang="en-US" sz="2000" dirty="0"/>
               <a:t>Issues:</a:t>
             </a:r>
           </a:p>
@@ -5028,7 +4966,7 @@
               <a:buChar char="q"/>
             </a:pPr>
             <a:r>
-              <a:rPr lang="en-US" sz="2000" dirty="0" smtClean="0"/>
+              <a:rPr lang="en-US" sz="2000" dirty="0"/>
               <a:t>Number of members</a:t>
             </a:r>
           </a:p>
@@ -5038,14 +4976,9 @@
               <a:buChar char="q"/>
             </a:pPr>
             <a:r>
-              <a:rPr lang="en-US" sz="2000" dirty="0" smtClean="0"/>
-              <a:t>Term of </a:t>
-            </a:r>
-            <a:r>
-              <a:rPr lang="en-US" sz="2000" dirty="0" smtClean="0"/>
-              <a:t>service</a:t>
-            </a:r>
-            <a:endParaRPr lang="en-US" sz="2000" dirty="0" smtClean="0"/>
+              <a:rPr lang="en-US" sz="2000" dirty="0"/>
+              <a:t>Term of service</a:t>
+            </a:r>
           </a:p>
           <a:p>
             <a:pPr lvl="3" fontAlgn="base">
@@ -5053,7 +4986,7 @@
               <a:buChar char="q"/>
             </a:pPr>
             <a:r>
-              <a:rPr lang="en-US" sz="2000" dirty="0" smtClean="0"/>
+              <a:rPr lang="en-US" sz="2000" dirty="0"/>
               <a:t>Credit for service</a:t>
             </a:r>
           </a:p>
@@ -5138,17 +5071,8 @@
           <a:p>
             <a:r>
               <a:rPr lang="en-US" dirty="0"/>
-              <a:t>What are the minimum requirements </a:t>
-            </a:r>
-            <a:r>
-              <a:rPr lang="en-US" dirty="0" smtClean="0"/>
-              <a:t>for a script to be considered reusable</a:t>
-            </a:r>
-            <a:r>
-              <a:rPr lang="en-US" dirty="0" smtClean="0"/>
-              <a:t>?  </a:t>
-            </a:r>
-            <a:endParaRPr lang="en-US" dirty="0"/>
+              <a:t>What are the minimum requirements for software to be included?  </a:t>
+            </a:r>
           </a:p>
         </p:txBody>
       </p:sp>
@@ -5165,7 +5089,7 @@
         <p:spPr/>
         <p:txBody>
           <a:bodyPr>
-            <a:normAutofit/>
+            <a:normAutofit fontScale="92500" lnSpcReduction="10000"/>
           </a:bodyPr>
           <a:lstStyle/>
           <a:p>
@@ -5174,7 +5098,7 @@
               <a:buChar char="q"/>
             </a:pPr>
             <a:r>
-              <a:rPr lang="en-US" dirty="0" smtClean="0"/>
+              <a:rPr lang="en-US" dirty="0"/>
               <a:t>Generalized, not project specific</a:t>
             </a:r>
           </a:p>
@@ -5184,12 +5108,8 @@
               <a:buChar char="q"/>
             </a:pPr>
             <a:r>
-              <a:rPr lang="en-US" dirty="0" smtClean="0"/>
-              <a:t>Well documented at the code package </a:t>
-            </a:r>
-            <a:r>
-              <a:rPr lang="en-US" dirty="0" smtClean="0"/>
-              <a:t>level</a:t>
+              <a:rPr lang="en-US" dirty="0"/>
+              <a:t>Well documented:</a:t>
             </a:r>
           </a:p>
           <a:p>
@@ -5198,20 +5118,16 @@
               <a:buChar char="q"/>
             </a:pPr>
             <a:r>
-              <a:rPr lang="en-US" dirty="0" err="1" smtClean="0"/>
-              <a:t>CodeMeta</a:t>
-            </a:r>
-            <a:r>
-              <a:rPr lang="en-US" dirty="0" smtClean="0"/>
-              <a:t> </a:t>
-            </a:r>
-            <a:r>
-              <a:rPr lang="en-US" dirty="0" smtClean="0"/>
-              <a:t>minimal metadata schema for science software and </a:t>
-            </a:r>
-            <a:r>
-              <a:rPr lang="en-US" dirty="0" smtClean="0"/>
-              <a:t>code</a:t>
+              <a:rPr lang="en-US" dirty="0"/>
+              <a:t> At the package level – using metadata (e.g. </a:t>
+            </a:r>
+            <a:r>
+              <a:rPr lang="en-US" dirty="0" err="1"/>
+              <a:t>codemeta</a:t>
+            </a:r>
+            <a:r>
+              <a:rPr lang="en-US" dirty="0"/>
+              <a:t> project), installation instructions, example use (e.g. vignette)</a:t>
             </a:r>
           </a:p>
           <a:p>
@@ -5220,16 +5136,8 @@
               <a:buChar char="q"/>
             </a:pPr>
             <a:r>
-              <a:rPr lang="en-US" dirty="0" smtClean="0"/>
-              <a:t>Documentation </a:t>
-            </a:r>
-            <a:r>
-              <a:rPr lang="en-US" dirty="0" smtClean="0"/>
-              <a:t>of how code is installed and </a:t>
-            </a:r>
-            <a:r>
-              <a:rPr lang="en-US" dirty="0" smtClean="0"/>
-              <a:t>used</a:t>
+              <a:rPr lang="en-US" dirty="0"/>
+              <a:t> At the script level – commented and consistent with language best practices</a:t>
             </a:r>
           </a:p>
           <a:p>
@@ -5238,8 +5146,38 @@
               <a:buChar char="q"/>
             </a:pPr>
             <a:r>
-              <a:rPr lang="en-US" dirty="0" smtClean="0"/>
-              <a:t>Well documented within the script</a:t>
+              <a:rPr lang="en-US" dirty="0"/>
+              <a:t>Version controlled – so users are aware of changes</a:t>
+            </a:r>
+          </a:p>
+          <a:p>
+            <a:pPr>
+              <a:buFont typeface="Wingdings" panose="05000000000000000000" pitchFamily="2" charset="2"/>
+              <a:buChar char="q"/>
+            </a:pPr>
+            <a:r>
+              <a:rPr lang="en-US" dirty="0"/>
+              <a:t>Road map – defining intended scope of the code</a:t>
+            </a:r>
+          </a:p>
+          <a:p>
+            <a:pPr>
+              <a:buFont typeface="Wingdings" panose="05000000000000000000" pitchFamily="2" charset="2"/>
+              <a:buChar char="q"/>
+            </a:pPr>
+            <a:r>
+              <a:rPr lang="en-US" dirty="0"/>
+              <a:t>Error messages – provides meaningful feedback</a:t>
+            </a:r>
+          </a:p>
+          <a:p>
+            <a:pPr>
+              <a:buFont typeface="Wingdings" panose="05000000000000000000" pitchFamily="2" charset="2"/>
+              <a:buChar char="q"/>
+            </a:pPr>
+            <a:r>
+              <a:rPr lang="en-US" dirty="0"/>
+              <a:t>Passes tests:</a:t>
             </a:r>
           </a:p>
           <a:p>
@@ -5248,26 +5186,8 @@
               <a:buChar char="q"/>
             </a:pPr>
             <a:r>
-              <a:rPr lang="en-US" dirty="0" smtClean="0"/>
-              <a:t>Code </a:t>
-            </a:r>
-            <a:r>
-              <a:rPr lang="en-US" dirty="0" smtClean="0"/>
-              <a:t>is thoroughly commented and adheres to a language-specific style guide</a:t>
-            </a:r>
-          </a:p>
-          <a:p>
-            <a:pPr>
-              <a:buFont typeface="Wingdings" panose="05000000000000000000" pitchFamily="2" charset="2"/>
-              <a:buChar char="q"/>
-            </a:pPr>
-            <a:r>
-              <a:rPr lang="en-US" dirty="0" smtClean="0"/>
-              <a:t>Passes tests </a:t>
-            </a:r>
-            <a:r>
-              <a:rPr lang="en-US" dirty="0" smtClean="0"/>
-              <a:t>of the code itself</a:t>
+              <a:rPr lang="en-US" dirty="0"/>
+              <a:t>does the code do what it says it does</a:t>
             </a:r>
           </a:p>
           <a:p>
@@ -5276,63 +5196,21 @@
               <a:buChar char="q"/>
             </a:pPr>
             <a:r>
-              <a:rPr lang="en-US" dirty="0" smtClean="0"/>
-              <a:t>Example </a:t>
-            </a:r>
-            <a:r>
-              <a:rPr lang="en-US" dirty="0" smtClean="0"/>
-              <a:t>inputs</a:t>
-            </a:r>
-            <a:r>
-              <a:rPr lang="en-US" dirty="0" smtClean="0"/>
-              <a:t> </a:t>
-            </a:r>
-            <a:r>
-              <a:rPr lang="en-US" dirty="0"/>
-              <a:t>and expected output (use cases</a:t>
-            </a:r>
-            <a:r>
-              <a:rPr lang="en-US" dirty="0" smtClean="0"/>
-              <a:t>) </a:t>
-            </a:r>
-          </a:p>
-          <a:p>
-            <a:pPr lvl="2">
-              <a:buFont typeface="Wingdings" panose="05000000000000000000" pitchFamily="2" charset="2"/>
-              <a:buChar char="q"/>
-            </a:pPr>
-            <a:r>
-              <a:rPr lang="en-US" dirty="0" smtClean="0"/>
-              <a:t>Code does what it says it says it will do</a:t>
-            </a:r>
-          </a:p>
-          <a:p>
-            <a:pPr lvl="1">
-              <a:buFont typeface="Wingdings" panose="05000000000000000000" pitchFamily="2" charset="2"/>
-              <a:buChar char="q"/>
-            </a:pPr>
-            <a:r>
-              <a:rPr lang="en-US" dirty="0" smtClean="0"/>
-              <a:t>Robust to variations in inputs</a:t>
-            </a:r>
+              <a:rPr lang="en-US" dirty="0"/>
+              <a:t>what methods do the authors use to test the code</a:t>
+            </a:r>
+          </a:p>
+          <a:p>
+            <a:pPr marL="201168" lvl="1" indent="0">
+              <a:buNone/>
+            </a:pPr>
+            <a:endParaRPr lang="en-US" dirty="0"/>
           </a:p>
           <a:p>
             <a:pPr marL="0" indent="0">
               <a:buNone/>
             </a:pPr>
-            <a:endParaRPr lang="en-US" dirty="0" smtClean="0"/>
-          </a:p>
-          <a:p>
-            <a:pPr marL="201168" lvl="1" indent="0">
-              <a:buNone/>
-            </a:pPr>
-            <a:endParaRPr lang="en-US" dirty="0" smtClean="0"/>
-          </a:p>
-          <a:p>
-            <a:pPr marL="0" indent="0">
-              <a:buNone/>
-            </a:pPr>
-            <a:endParaRPr lang="en-US" dirty="0" smtClean="0"/>
+            <a:endParaRPr lang="en-US" dirty="0"/>
           </a:p>
           <a:p>
             <a:pPr marL="201168" lvl="1" indent="0">
@@ -5364,7 +5242,7 @@
         </p:blipFill>
         <p:spPr>
           <a:xfrm>
-            <a:off x="9742818" y="2480344"/>
+            <a:off x="9080308" y="2883016"/>
             <a:ext cx="2075372" cy="1377070"/>
           </a:xfrm>
           <a:prstGeom prst="rect">
@@ -5418,10 +5296,9 @@
           <a:lstStyle/>
           <a:p>
             <a:r>
-              <a:rPr lang="en-US" dirty="0" smtClean="0"/>
+              <a:rPr lang="en-US" dirty="0"/>
               <a:t>What mechanisms will be employed to ensure that code is discoverable?</a:t>
             </a:r>
-            <a:endParaRPr lang="en-US" dirty="0"/>
           </a:p>
         </p:txBody>
       </p:sp>
@@ -5437,7 +5314,9 @@
         </p:nvSpPr>
         <p:spPr/>
         <p:txBody>
-          <a:bodyPr/>
+          <a:bodyPr>
+            <a:normAutofit fontScale="92500" lnSpcReduction="10000"/>
+          </a:bodyPr>
           <a:lstStyle/>
           <a:p>
             <a:pPr>
@@ -5445,16 +5324,8 @@
               <a:buChar char="q"/>
             </a:pPr>
             <a:r>
-              <a:rPr lang="en-US" dirty="0" smtClean="0"/>
-              <a:t>Develop a controlled vocabulary for </a:t>
-            </a:r>
-            <a:r>
-              <a:rPr lang="en-US" dirty="0" err="1" smtClean="0"/>
-              <a:t>CodeMeta</a:t>
-            </a:r>
-            <a:r>
-              <a:rPr lang="en-US" dirty="0" smtClean="0"/>
-              <a:t> (keywords element) and repository tags</a:t>
+              <a:rPr lang="en-US" dirty="0"/>
+              <a:t>A controlled vocabulary for code metadata and repository tags</a:t>
             </a:r>
           </a:p>
           <a:p>
@@ -5463,10 +5334,9 @@
               <a:buChar char="q"/>
             </a:pPr>
             <a:r>
-              <a:rPr lang="en-US" dirty="0" smtClean="0"/>
-              <a:t>Develop an application to query the software metadata</a:t>
-            </a:r>
-            <a:endParaRPr lang="en-US" dirty="0"/>
+              <a:rPr lang="en-US" dirty="0"/>
+              <a:t>An an application to query the metadata of software in the repository. E.g.:</a:t>
+            </a:r>
           </a:p>
           <a:p>
             <a:pPr lvl="1">
@@ -5474,8 +5344,8 @@
               <a:buChar char="q"/>
             </a:pPr>
             <a:r>
-              <a:rPr lang="en-US" dirty="0" smtClean="0"/>
-              <a:t>Author</a:t>
+              <a:rPr lang="en-US" dirty="0"/>
+              <a:t>Creator</a:t>
             </a:r>
           </a:p>
           <a:p>
@@ -5484,15 +5354,105 @@
               <a:buChar char="q"/>
             </a:pPr>
             <a:r>
-              <a:rPr lang="en-US" dirty="0" smtClean="0"/>
-              <a:t>Operating system specifics</a:t>
+              <a:rPr lang="en-US" dirty="0"/>
+              <a:t>Description</a:t>
+            </a:r>
+          </a:p>
+          <a:p>
+            <a:pPr lvl="1">
+              <a:buFont typeface="Wingdings" panose="05000000000000000000" pitchFamily="2" charset="2"/>
+              <a:buChar char="q"/>
+            </a:pPr>
+            <a:r>
+              <a:rPr lang="en-US" dirty="0"/>
+              <a:t>Encoding</a:t>
+            </a:r>
+          </a:p>
+          <a:p>
+            <a:pPr lvl="1">
+              <a:buFont typeface="Wingdings" panose="05000000000000000000" pitchFamily="2" charset="2"/>
+              <a:buChar char="q"/>
+            </a:pPr>
+            <a:r>
+              <a:rPr lang="en-US" dirty="0"/>
+              <a:t>Funder</a:t>
+            </a:r>
+          </a:p>
+          <a:p>
+            <a:pPr lvl="1">
+              <a:buFont typeface="Wingdings" panose="05000000000000000000" pitchFamily="2" charset="2"/>
+              <a:buChar char="q"/>
+            </a:pPr>
+            <a:r>
+              <a:rPr lang="en-US" dirty="0"/>
+              <a:t>Keywords</a:t>
+            </a:r>
+          </a:p>
+          <a:p>
+            <a:pPr lvl="1">
+              <a:buFont typeface="Wingdings" panose="05000000000000000000" pitchFamily="2" charset="2"/>
+              <a:buChar char="q"/>
+            </a:pPr>
+            <a:r>
+              <a:rPr lang="en-US" dirty="0"/>
+              <a:t>License</a:t>
+            </a:r>
+          </a:p>
+          <a:p>
+            <a:pPr lvl="1">
+              <a:buFont typeface="Wingdings" panose="05000000000000000000" pitchFamily="2" charset="2"/>
+              <a:buChar char="q"/>
+            </a:pPr>
+            <a:r>
+              <a:rPr lang="en-US" dirty="0"/>
+              <a:t>Programming language</a:t>
+            </a:r>
+          </a:p>
+          <a:p>
+            <a:pPr lvl="1">
+              <a:buFont typeface="Wingdings" panose="05000000000000000000" pitchFamily="2" charset="2"/>
+              <a:buChar char="q"/>
+            </a:pPr>
+            <a:r>
+              <a:rPr lang="en-US" dirty="0"/>
+              <a:t>Software help</a:t>
+            </a:r>
+          </a:p>
+          <a:p>
+            <a:pPr lvl="1">
+              <a:buFont typeface="Wingdings" panose="05000000000000000000" pitchFamily="2" charset="2"/>
+              <a:buChar char="q"/>
+            </a:pPr>
+            <a:r>
+              <a:rPr lang="en-US" dirty="0"/>
+              <a:t>Software requirements</a:t>
+            </a:r>
+          </a:p>
+          <a:p>
+            <a:pPr lvl="1">
+              <a:buFont typeface="Wingdings" panose="05000000000000000000" pitchFamily="2" charset="2"/>
+              <a:buChar char="q"/>
+            </a:pPr>
+            <a:r>
+              <a:rPr lang="en-US" dirty="0"/>
+              <a:t>Readme</a:t>
+            </a:r>
+          </a:p>
+          <a:p>
+            <a:pPr lvl="1">
+              <a:buFont typeface="Wingdings" panose="05000000000000000000" pitchFamily="2" charset="2"/>
+              <a:buChar char="q"/>
+            </a:pPr>
+            <a:r>
+              <a:rPr lang="en-US" dirty="0"/>
+              <a:t>Etc.</a:t>
             </a:r>
           </a:p>
           <a:p>
             <a:pPr marL="201168" lvl="1" indent="0">
               <a:buNone/>
             </a:pPr>
-            <a:endParaRPr lang="en-US" dirty="0" smtClean="0"/>
+            <a:endParaRPr lang="en-US" dirty="0"/>
           </a:p>
         </p:txBody>
       </p:sp>
@@ -5572,10 +5532,9 @@
           <a:lstStyle/>
           <a:p>
             <a:r>
-              <a:rPr lang="en-US" dirty="0" smtClean="0"/>
+              <a:rPr lang="en-US" dirty="0"/>
               <a:t>Other considerations</a:t>
             </a:r>
-            <a:endParaRPr lang="en-US" dirty="0"/>
           </a:p>
         </p:txBody>
       </p:sp>
@@ -5599,7 +5558,7 @@
               <a:buChar char="q"/>
             </a:pPr>
             <a:r>
-              <a:rPr lang="en-US" dirty="0" smtClean="0"/>
+              <a:rPr lang="en-US" dirty="0"/>
               <a:t>Incentives to contribute to repository</a:t>
             </a:r>
           </a:p>
@@ -5609,7 +5568,7 @@
               <a:buChar char="q"/>
             </a:pPr>
             <a:r>
-              <a:rPr lang="en-US" dirty="0" smtClean="0"/>
+              <a:rPr lang="en-US" dirty="0"/>
               <a:t>Maintenance/updates of code</a:t>
             </a:r>
           </a:p>
@@ -5619,10 +5578,9 @@
               <a:buChar char="q"/>
             </a:pPr>
             <a:r>
-              <a:rPr lang="en-US" dirty="0" smtClean="0"/>
+              <a:rPr lang="en-US" dirty="0"/>
               <a:t>User support by code creator?</a:t>
             </a:r>
-            <a:endParaRPr lang="en-US" dirty="0" smtClean="0"/>
           </a:p>
           <a:p>
             <a:pPr>
@@ -5630,7 +5588,7 @@
               <a:buChar char="q"/>
             </a:pPr>
             <a:r>
-              <a:rPr lang="en-US" dirty="0" smtClean="0"/>
+              <a:rPr lang="en-US" dirty="0"/>
               <a:t>Licensing</a:t>
             </a:r>
           </a:p>
@@ -5640,10 +5598,9 @@
               <a:buChar char="q"/>
             </a:pPr>
             <a:r>
-              <a:rPr lang="en-US" dirty="0" smtClean="0"/>
+              <a:rPr lang="en-US" dirty="0"/>
               <a:t>Citation/DOI</a:t>
             </a:r>
-            <a:endParaRPr lang="en-US" dirty="0" smtClean="0"/>
           </a:p>
           <a:p>
             <a:pPr marL="0" indent="0">

</xml_diff>